<commit_message>
Added Lean concept slide
</commit_message>
<xml_diff>
--- a/Documentation/MovieS.pptx
+++ b/Documentation/MovieS.pptx
@@ -10,11 +10,12 @@
     <p:sldId id="258" r:id="rId7"/>
     <p:sldId id="261" r:id="rId8"/>
     <p:sldId id="259" r:id="rId9"/>
-    <p:sldId id="260" r:id="rId10"/>
-    <p:sldId id="262" r:id="rId11"/>
-    <p:sldId id="263" r:id="rId12"/>
-    <p:sldId id="264" r:id="rId13"/>
-    <p:sldId id="265" r:id="rId14"/>
+    <p:sldId id="266" r:id="rId10"/>
+    <p:sldId id="260" r:id="rId11"/>
+    <p:sldId id="262" r:id="rId12"/>
+    <p:sldId id="263" r:id="rId13"/>
+    <p:sldId id="264" r:id="rId14"/>
+    <p:sldId id="265" r:id="rId15"/>
   </p:sldIdLst>
   <p:sldSz cx="6858000" cy="9144000" type="letter"/>
   <p:notesSz cx="6858000" cy="9144000"/>
@@ -936,7 +937,7 @@
           <a:p>
             <a:fld id="{552E2C6F-EF9B-4B9B-9664-C8CFFD5D581A}" type="datetimeFigureOut">
               <a:rPr lang="en-US" smtClean="0"/>
-              <a:t>1/25/2022</a:t>
+              <a:t>1/26/2022</a:t>
             </a:fld>
             <a:endParaRPr lang="en-US" dirty="0"/>
           </a:p>
@@ -1187,7 +1188,7 @@
           <a:p>
             <a:fld id="{552E2C6F-EF9B-4B9B-9664-C8CFFD5D581A}" type="datetimeFigureOut">
               <a:rPr lang="en-US" smtClean="0"/>
-              <a:t>1/25/2022</a:t>
+              <a:t>1/26/2022</a:t>
             </a:fld>
             <a:endParaRPr lang="en-US" dirty="0"/>
           </a:p>
@@ -1501,7 +1502,7 @@
           <a:p>
             <a:fld id="{552E2C6F-EF9B-4B9B-9664-C8CFFD5D581A}" type="datetimeFigureOut">
               <a:rPr lang="en-US" smtClean="0"/>
-              <a:t>1/25/2022</a:t>
+              <a:t>1/26/2022</a:t>
             </a:fld>
             <a:endParaRPr lang="en-US" dirty="0"/>
           </a:p>
@@ -1834,7 +1835,7 @@
           <a:p>
             <a:fld id="{552E2C6F-EF9B-4B9B-9664-C8CFFD5D581A}" type="datetimeFigureOut">
               <a:rPr lang="en-US" smtClean="0"/>
-              <a:t>1/25/2022</a:t>
+              <a:t>1/26/2022</a:t>
             </a:fld>
             <a:endParaRPr lang="en-US" dirty="0"/>
           </a:p>
@@ -2148,7 +2149,7 @@
           <a:p>
             <a:fld id="{552E2C6F-EF9B-4B9B-9664-C8CFFD5D581A}" type="datetimeFigureOut">
               <a:rPr lang="en-US" smtClean="0"/>
-              <a:t>1/25/2022</a:t>
+              <a:t>1/26/2022</a:t>
             </a:fld>
             <a:endParaRPr lang="en-US" dirty="0"/>
           </a:p>
@@ -2541,7 +2542,7 @@
           <a:p>
             <a:fld id="{552E2C6F-EF9B-4B9B-9664-C8CFFD5D581A}" type="datetimeFigureOut">
               <a:rPr lang="en-US" smtClean="0"/>
-              <a:t>1/25/2022</a:t>
+              <a:t>1/26/2022</a:t>
             </a:fld>
             <a:endParaRPr lang="en-US" dirty="0"/>
           </a:p>
@@ -2711,7 +2712,7 @@
           <a:p>
             <a:fld id="{552E2C6F-EF9B-4B9B-9664-C8CFFD5D581A}" type="datetimeFigureOut">
               <a:rPr lang="en-US" smtClean="0"/>
-              <a:t>1/25/2022</a:t>
+              <a:t>1/26/2022</a:t>
             </a:fld>
             <a:endParaRPr lang="en-US" dirty="0"/>
           </a:p>
@@ -2891,7 +2892,7 @@
           <a:p>
             <a:fld id="{552E2C6F-EF9B-4B9B-9664-C8CFFD5D581A}" type="datetimeFigureOut">
               <a:rPr lang="en-US" smtClean="0"/>
-              <a:t>1/25/2022</a:t>
+              <a:t>1/26/2022</a:t>
             </a:fld>
             <a:endParaRPr lang="en-US" dirty="0"/>
           </a:p>
@@ -3946,7 +3947,7 @@
           <a:p>
             <a:fld id="{552E2C6F-EF9B-4B9B-9664-C8CFFD5D581A}" type="datetimeFigureOut">
               <a:rPr lang="en-US" smtClean="0"/>
-              <a:t>1/25/2022</a:t>
+              <a:t>1/26/2022</a:t>
             </a:fld>
             <a:endParaRPr lang="en-US" dirty="0"/>
           </a:p>
@@ -4193,7 +4194,7 @@
           <a:p>
             <a:fld id="{552E2C6F-EF9B-4B9B-9664-C8CFFD5D581A}" type="datetimeFigureOut">
               <a:rPr lang="en-US" smtClean="0"/>
-              <a:t>1/25/2022</a:t>
+              <a:t>1/26/2022</a:t>
             </a:fld>
             <a:endParaRPr lang="en-US" dirty="0"/>
           </a:p>
@@ -4490,7 +4491,7 @@
           <a:p>
             <a:fld id="{552E2C6F-EF9B-4B9B-9664-C8CFFD5D581A}" type="datetimeFigureOut">
               <a:rPr lang="en-US" smtClean="0"/>
-              <a:t>1/25/2022</a:t>
+              <a:t>1/26/2022</a:t>
             </a:fld>
             <a:endParaRPr lang="en-US" dirty="0"/>
           </a:p>
@@ -4869,7 +4870,7 @@
           <a:p>
             <a:fld id="{552E2C6F-EF9B-4B9B-9664-C8CFFD5D581A}" type="datetimeFigureOut">
               <a:rPr lang="en-US" smtClean="0"/>
-              <a:t>1/25/2022</a:t>
+              <a:t>1/26/2022</a:t>
             </a:fld>
             <a:endParaRPr lang="en-US" dirty="0"/>
           </a:p>
@@ -4992,7 +4993,7 @@
           <a:p>
             <a:fld id="{552E2C6F-EF9B-4B9B-9664-C8CFFD5D581A}" type="datetimeFigureOut">
               <a:rPr lang="en-US" smtClean="0"/>
-              <a:t>1/25/2022</a:t>
+              <a:t>1/26/2022</a:t>
             </a:fld>
             <a:endParaRPr lang="en-US" dirty="0"/>
           </a:p>
@@ -5087,7 +5088,7 @@
           <a:p>
             <a:fld id="{2E975E58-1529-4942-85D9-4437A17B2BE2}" type="datetimeFigureOut">
               <a:rPr lang="en-US" smtClean="0"/>
-              <a:t>1/25/2022</a:t>
+              <a:t>1/26/2022</a:t>
             </a:fld>
             <a:endParaRPr lang="en-US"/>
           </a:p>
@@ -5342,7 +5343,7 @@
           <a:p>
             <a:fld id="{552E2C6F-EF9B-4B9B-9664-C8CFFD5D581A}" type="datetimeFigureOut">
               <a:rPr lang="en-US" smtClean="0"/>
-              <a:t>1/25/2022</a:t>
+              <a:t>1/26/2022</a:t>
             </a:fld>
             <a:endParaRPr lang="en-US" dirty="0"/>
           </a:p>
@@ -5605,7 +5606,7 @@
           <a:p>
             <a:fld id="{552E2C6F-EF9B-4B9B-9664-C8CFFD5D581A}" type="datetimeFigureOut">
               <a:rPr lang="en-US" smtClean="0"/>
-              <a:t>1/25/2022</a:t>
+              <a:t>1/26/2022</a:t>
             </a:fld>
             <a:endParaRPr lang="en-US" dirty="0"/>
           </a:p>
@@ -6419,7 +6420,7 @@
           <a:p>
             <a:fld id="{552E2C6F-EF9B-4B9B-9664-C8CFFD5D581A}" type="datetimeFigureOut">
               <a:rPr lang="en-US" smtClean="0"/>
-              <a:t>1/25/2022</a:t>
+              <a:t>1/26/2022</a:t>
             </a:fld>
             <a:endParaRPr lang="en-US" dirty="0"/>
           </a:p>
@@ -7218,6 +7219,161 @@
             </a:pPr>
             <a:r>
               <a:rPr lang="en-US" sz="2000" b="1" dirty="0"/>
+              <a:t>Recommendation </a:t>
+            </a:r>
+          </a:p>
+          <a:p>
+            <a:pPr>
+              <a:buFont typeface="Wingdings" panose="05000000000000000000" pitchFamily="2" charset="2"/>
+              <a:buChar char="v"/>
+            </a:pPr>
+            <a:r>
+              <a:rPr lang="en-US" sz="1600" dirty="0"/>
+              <a:t>Actor who is part of most of the movies in high earning movies but may not be lead actor. Tom hanks seems to be most dependable actor followed by Jennifer, confirming women power.</a:t>
+            </a:r>
+          </a:p>
+          <a:p>
+            <a:pPr>
+              <a:buFont typeface="Wingdings" panose="05000000000000000000" pitchFamily="2" charset="2"/>
+              <a:buChar char="v"/>
+            </a:pPr>
+            <a:endParaRPr lang="en-US" sz="1600" dirty="0"/>
+          </a:p>
+          <a:p>
+            <a:pPr marL="0" indent="0">
+              <a:buNone/>
+            </a:pPr>
+            <a:r>
+              <a:rPr lang="en-US" sz="1600" dirty="0"/>
+              <a:t> </a:t>
+            </a:r>
+          </a:p>
+          <a:p>
+            <a:endParaRPr lang="en-US" sz="1600" dirty="0"/>
+          </a:p>
+          <a:p>
+            <a:endParaRPr lang="en-US" sz="1600" dirty="0"/>
+          </a:p>
+        </p:txBody>
+      </p:sp>
+      <p:pic>
+        <p:nvPicPr>
+          <p:cNvPr id="6" name="Picture 5">
+            <a:extLst>
+              <a:ext uri="{FF2B5EF4-FFF2-40B4-BE49-F238E27FC236}">
+                <a16:creationId xmlns:a16="http://schemas.microsoft.com/office/drawing/2014/main" id="{898AECE2-4D37-4E85-9B16-8434E6D7A0B2}"/>
+              </a:ext>
+            </a:extLst>
+          </p:cNvPr>
+          <p:cNvPicPr>
+            <a:picLocks noChangeAspect="1"/>
+          </p:cNvPicPr>
+          <p:nvPr/>
+        </p:nvPicPr>
+        <p:blipFill>
+          <a:blip r:embed="rId2"/>
+          <a:stretch>
+            <a:fillRect/>
+          </a:stretch>
+        </p:blipFill>
+        <p:spPr>
+          <a:xfrm>
+            <a:off x="1036461" y="182033"/>
+            <a:ext cx="2933700" cy="1600200"/>
+          </a:xfrm>
+          <a:prstGeom prst="rect">
+            <a:avLst/>
+          </a:prstGeom>
+        </p:spPr>
+      </p:pic>
+      <p:pic>
+        <p:nvPicPr>
+          <p:cNvPr id="3" name="Picture 2">
+            <a:extLst>
+              <a:ext uri="{FF2B5EF4-FFF2-40B4-BE49-F238E27FC236}">
+                <a16:creationId xmlns:a16="http://schemas.microsoft.com/office/drawing/2014/main" id="{AC3C19C6-3550-4292-9CC8-6C7EB6050C40}"/>
+              </a:ext>
+            </a:extLst>
+          </p:cNvPr>
+          <p:cNvPicPr>
+            <a:picLocks noChangeAspect="1"/>
+          </p:cNvPicPr>
+          <p:nvPr/>
+        </p:nvPicPr>
+        <p:blipFill>
+          <a:blip r:embed="rId3"/>
+          <a:stretch>
+            <a:fillRect/>
+          </a:stretch>
+        </p:blipFill>
+        <p:spPr>
+          <a:xfrm>
+            <a:off x="564268" y="4572000"/>
+            <a:ext cx="5236785" cy="4220461"/>
+          </a:xfrm>
+          <a:prstGeom prst="rect">
+            <a:avLst/>
+          </a:prstGeom>
+        </p:spPr>
+      </p:pic>
+    </p:spTree>
+    <p:extLst>
+      <p:ext uri="{BB962C8B-B14F-4D97-AF65-F5344CB8AC3E}">
+        <p14:creationId xmlns:p14="http://schemas.microsoft.com/office/powerpoint/2010/main" val="1488732586"/>
+      </p:ext>
+    </p:extLst>
+  </p:cSld>
+  <p:clrMapOvr>
+    <a:masterClrMapping/>
+  </p:clrMapOvr>
+</p:sld>
+</file>
+
+<file path=ppt/slides/slide11.xml><?xml version="1.0" encoding="utf-8"?>
+<p:sld xmlns:a="http://schemas.openxmlformats.org/drawingml/2006/main" xmlns:r="http://schemas.openxmlformats.org/officeDocument/2006/relationships" xmlns:p="http://schemas.openxmlformats.org/presentationml/2006/main">
+  <p:cSld>
+    <p:spTree>
+      <p:nvGrpSpPr>
+        <p:cNvPr id="1" name=""/>
+        <p:cNvGrpSpPr/>
+        <p:nvPr/>
+      </p:nvGrpSpPr>
+      <p:grpSpPr>
+        <a:xfrm>
+          <a:off x="0" y="0"/>
+          <a:ext cx="0" cy="0"/>
+          <a:chOff x="0" y="0"/>
+          <a:chExt cx="0" cy="0"/>
+        </a:xfrm>
+      </p:grpSpPr>
+      <p:sp>
+        <p:nvSpPr>
+          <p:cNvPr id="4" name="Content Placeholder 3">
+            <a:extLst>
+              <a:ext uri="{FF2B5EF4-FFF2-40B4-BE49-F238E27FC236}">
+                <a16:creationId xmlns:a16="http://schemas.microsoft.com/office/drawing/2014/main" id="{D2213E38-3358-4888-93EA-37BCC5581424}"/>
+              </a:ext>
+            </a:extLst>
+          </p:cNvPr>
+          <p:cNvSpPr>
+            <a:spLocks noGrp="1"/>
+          </p:cNvSpPr>
+          <p:nvPr>
+            <p:ph idx="1"/>
+          </p:nvPr>
+        </p:nvSpPr>
+        <p:spPr/>
+        <p:txBody>
+          <a:bodyPr>
+            <a:normAutofit/>
+          </a:bodyPr>
+          <a:lstStyle/>
+          <a:p>
+            <a:pPr marL="0" indent="0" algn="ctr">
+              <a:buNone/>
+            </a:pPr>
+            <a:r>
+              <a:rPr lang="en-US" sz="2000" b="1" dirty="0"/>
               <a:t>Dashboard </a:t>
             </a:r>
           </a:p>
@@ -7917,7 +8073,7 @@
         </p:blipFill>
         <p:spPr>
           <a:xfrm>
-            <a:off x="4303583" y="7360119"/>
+            <a:off x="4702052" y="6610436"/>
             <a:ext cx="485775" cy="495300"/>
           </a:xfrm>
           <a:prstGeom prst="rect">
@@ -7947,8 +8103,38 @@
         </p:blipFill>
         <p:spPr>
           <a:xfrm>
-            <a:off x="3424926" y="7221228"/>
-            <a:ext cx="685800" cy="742950"/>
+            <a:off x="3184396" y="7190082"/>
+            <a:ext cx="470631" cy="509850"/>
+          </a:xfrm>
+          <a:prstGeom prst="rect">
+            <a:avLst/>
+          </a:prstGeom>
+        </p:spPr>
+      </p:pic>
+      <p:pic>
+        <p:nvPicPr>
+          <p:cNvPr id="4" name="Picture 3">
+            <a:extLst>
+              <a:ext uri="{FF2B5EF4-FFF2-40B4-BE49-F238E27FC236}">
+                <a16:creationId xmlns:a16="http://schemas.microsoft.com/office/drawing/2014/main" id="{13BD2280-F8F5-433D-A7A1-D2E60599BA45}"/>
+              </a:ext>
+            </a:extLst>
+          </p:cNvPr>
+          <p:cNvPicPr>
+            <a:picLocks noChangeAspect="1"/>
+          </p:cNvPicPr>
+          <p:nvPr/>
+        </p:nvPicPr>
+        <p:blipFill>
+          <a:blip r:embed="rId11"/>
+          <a:stretch>
+            <a:fillRect/>
+          </a:stretch>
+        </p:blipFill>
+        <p:spPr>
+          <a:xfrm>
+            <a:off x="3905656" y="7240510"/>
+            <a:ext cx="1149952" cy="818007"/>
           </a:xfrm>
           <a:prstGeom prst="rect">
             <a:avLst/>
@@ -8015,6 +8201,18 @@
             </a:r>
           </a:p>
           <a:p>
+            <a:pPr marL="0" indent="0">
+              <a:buNone/>
+            </a:pPr>
+            <a:endParaRPr lang="en-US" b="1" dirty="0"/>
+          </a:p>
+          <a:p>
+            <a:pPr marL="0" indent="0">
+              <a:buNone/>
+            </a:pPr>
+            <a:endParaRPr lang="en-US" b="1" dirty="0"/>
+          </a:p>
+          <a:p>
             <a:pPr>
               <a:buFont typeface="Wingdings" panose="05000000000000000000" pitchFamily="2" charset="2"/>
               <a:buChar char="v"/>
@@ -8040,32 +8238,16 @@
             </a:pPr>
             <a:r>
               <a:rPr lang="en-US" dirty="0"/>
-              <a:t>This data set was chosen as it provides a good summary of key metrics and the second data set has information about </a:t>
-            </a:r>
-            <a:r>
-              <a:rPr lang="en-US" dirty="0" err="1"/>
-              <a:t>facebook</a:t>
-            </a:r>
+              <a:t>These data sets were chosen as it provides a good summary of key metrics and the second data set has information about Facebook likes for each of the actors, director and the movie.</a:t>
+            </a:r>
+          </a:p>
+          <a:p>
+            <a:pPr marL="0" indent="0">
+              <a:buNone/>
+            </a:pPr>
             <a:r>
               <a:rPr lang="en-US" dirty="0"/>
-              <a:t> likes for each of the actors, director and the movie.</a:t>
-            </a:r>
-          </a:p>
-          <a:p>
-            <a:pPr marL="0" indent="0">
-              <a:buNone/>
-            </a:pPr>
-            <a:r>
-              <a:rPr lang="en-US" dirty="0"/>
-              <a:t>It also has a unique feature called </a:t>
-            </a:r>
-            <a:r>
-              <a:rPr lang="en-US" dirty="0" err="1"/>
-              <a:t>facebook</a:t>
-            </a:r>
-            <a:r>
-              <a:rPr lang="en-US" dirty="0"/>
-              <a:t> poster faces, since we do not have the data for marketing, this can be used as a proxy.</a:t>
+              <a:t>It also has a unique feature called Facebook poster faces, since we do not have the data for marketing, this can be used as a proxy.</a:t>
             </a:r>
           </a:p>
           <a:p>
@@ -8171,10 +8353,537 @@
           <a:p>
             <a:r>
               <a:rPr lang="en-US" dirty="0"/>
+              <a:t>CDA has assigned the job to MDB (Movie Data busters) team within the organization who are movie enthusiasts and are experts in the art and science of Data. </a:t>
+            </a:r>
+          </a:p>
+          <a:p>
+            <a:r>
+              <a:rPr lang="en-US" dirty="0"/>
+              <a:t>MDB team using </a:t>
+            </a:r>
+            <a:r>
+              <a:rPr lang="en-US" b="1" dirty="0"/>
+              <a:t>Lean</a:t>
+            </a:r>
+            <a:r>
+              <a:rPr lang="en-US" dirty="0"/>
+              <a:t> concepts have divided the work in multiple milestones. They are calling it HUD, Hollywood usable deliverables. </a:t>
+            </a:r>
+          </a:p>
+          <a:p>
+            <a:endParaRPr lang="en-US" dirty="0"/>
+          </a:p>
+        </p:txBody>
+      </p:sp>
+      <p:pic>
+        <p:nvPicPr>
+          <p:cNvPr id="8" name="Picture 7">
+            <a:extLst>
+              <a:ext uri="{FF2B5EF4-FFF2-40B4-BE49-F238E27FC236}">
+                <a16:creationId xmlns:a16="http://schemas.microsoft.com/office/drawing/2014/main" id="{E9C9907D-608C-4352-87BB-A4EFD2508D12}"/>
+              </a:ext>
+            </a:extLst>
+          </p:cNvPr>
+          <p:cNvPicPr>
+            <a:picLocks noChangeAspect="1"/>
+          </p:cNvPicPr>
+          <p:nvPr/>
+        </p:nvPicPr>
+        <p:blipFill>
+          <a:blip r:embed="rId2"/>
+          <a:stretch>
+            <a:fillRect/>
+          </a:stretch>
+        </p:blipFill>
+        <p:spPr>
+          <a:xfrm>
+            <a:off x="1476729" y="183125"/>
+            <a:ext cx="2395360" cy="2294257"/>
+          </a:xfrm>
+          <a:prstGeom prst="rect">
+            <a:avLst/>
+          </a:prstGeom>
+        </p:spPr>
+      </p:pic>
+      <p:sp>
+        <p:nvSpPr>
+          <p:cNvPr id="5" name="Rectangle 4">
+            <a:extLst>
+              <a:ext uri="{FF2B5EF4-FFF2-40B4-BE49-F238E27FC236}">
+                <a16:creationId xmlns:a16="http://schemas.microsoft.com/office/drawing/2014/main" id="{DF7C3AB9-738C-4B33-B8F5-65E6160C35E6}"/>
+              </a:ext>
+            </a:extLst>
+          </p:cNvPr>
+          <p:cNvSpPr/>
+          <p:nvPr/>
+        </p:nvSpPr>
+        <p:spPr>
+          <a:xfrm>
+            <a:off x="1551164" y="4724361"/>
+            <a:ext cx="2223911" cy="661898"/>
+          </a:xfrm>
+          <a:prstGeom prst="rect">
+            <a:avLst/>
+          </a:prstGeom>
+        </p:spPr>
+        <p:style>
+          <a:lnRef idx="2">
+            <a:schemeClr val="accent1">
+              <a:shade val="50000"/>
+            </a:schemeClr>
+          </a:lnRef>
+          <a:fillRef idx="1">
+            <a:schemeClr val="accent1"/>
+          </a:fillRef>
+          <a:effectRef idx="0">
+            <a:schemeClr val="accent1"/>
+          </a:effectRef>
+          <a:fontRef idx="minor">
+            <a:schemeClr val="lt1"/>
+          </a:fontRef>
+        </p:style>
+        <p:txBody>
+          <a:bodyPr rtlCol="0" anchor="ctr"/>
+          <a:lstStyle/>
+          <a:p>
+            <a:pPr algn="ctr"/>
+            <a:endParaRPr lang="en-US"/>
+          </a:p>
+        </p:txBody>
+      </p:sp>
+      <p:sp>
+        <p:nvSpPr>
+          <p:cNvPr id="4" name="TextBox 3">
+            <a:extLst>
+              <a:ext uri="{FF2B5EF4-FFF2-40B4-BE49-F238E27FC236}">
+                <a16:creationId xmlns:a16="http://schemas.microsoft.com/office/drawing/2014/main" id="{3F0C52AC-DC0F-40C5-8F2D-7E8AAC2CC386}"/>
+              </a:ext>
+            </a:extLst>
+          </p:cNvPr>
+          <p:cNvSpPr txBox="1"/>
+          <p:nvPr/>
+        </p:nvSpPr>
+        <p:spPr>
+          <a:xfrm>
+            <a:off x="1852673" y="4916811"/>
+            <a:ext cx="1814920" cy="276999"/>
+          </a:xfrm>
+          <a:prstGeom prst="rect">
+            <a:avLst/>
+          </a:prstGeom>
+          <a:noFill/>
+        </p:spPr>
+        <p:txBody>
+          <a:bodyPr wrap="none" rtlCol="0">
+            <a:spAutoFit/>
+          </a:bodyPr>
+          <a:lstStyle/>
+          <a:p>
+            <a:r>
+              <a:rPr lang="en-US" sz="1200" b="1" dirty="0">
+                <a:latin typeface="Verdana" panose="020B0604030504040204" pitchFamily="34" charset="0"/>
+                <a:ea typeface="Verdana" panose="020B0604030504040204" pitchFamily="34" charset="0"/>
+              </a:rPr>
+              <a:t>Creative Algorithm</a:t>
+            </a:r>
+          </a:p>
+        </p:txBody>
+      </p:sp>
+      <p:sp>
+        <p:nvSpPr>
+          <p:cNvPr id="9" name="Rectangle 8">
+            <a:extLst>
+              <a:ext uri="{FF2B5EF4-FFF2-40B4-BE49-F238E27FC236}">
+                <a16:creationId xmlns:a16="http://schemas.microsoft.com/office/drawing/2014/main" id="{DD2F42B1-430D-4F2C-B6F2-C13537512098}"/>
+              </a:ext>
+            </a:extLst>
+          </p:cNvPr>
+          <p:cNvSpPr/>
+          <p:nvPr/>
+        </p:nvSpPr>
+        <p:spPr>
+          <a:xfrm>
+            <a:off x="740717" y="6058807"/>
+            <a:ext cx="907461" cy="661898"/>
+          </a:xfrm>
+          <a:prstGeom prst="rect">
+            <a:avLst/>
+          </a:prstGeom>
+        </p:spPr>
+        <p:style>
+          <a:lnRef idx="2">
+            <a:schemeClr val="accent1">
+              <a:shade val="50000"/>
+            </a:schemeClr>
+          </a:lnRef>
+          <a:fillRef idx="1">
+            <a:schemeClr val="accent1"/>
+          </a:fillRef>
+          <a:effectRef idx="0">
+            <a:schemeClr val="accent1"/>
+          </a:effectRef>
+          <a:fontRef idx="minor">
+            <a:schemeClr val="lt1"/>
+          </a:fontRef>
+        </p:style>
+        <p:txBody>
+          <a:bodyPr rtlCol="0" anchor="ctr"/>
+          <a:lstStyle/>
+          <a:p>
+            <a:pPr algn="ctr"/>
+            <a:r>
+              <a:rPr lang="en-US" sz="1200" b="1" dirty="0">
+                <a:solidFill>
+                  <a:schemeClr val="tx1"/>
+                </a:solidFill>
+                <a:latin typeface="+mj-lt"/>
+                <a:ea typeface="Verdana" panose="020B0604030504040204" pitchFamily="34" charset="0"/>
+              </a:rPr>
+              <a:t>HUD - 1</a:t>
+            </a:r>
+          </a:p>
+          <a:p>
+            <a:pPr algn="ctr"/>
+            <a:endParaRPr lang="en-US" sz="1200" b="1" dirty="0">
+              <a:solidFill>
+                <a:schemeClr val="tx1"/>
+              </a:solidFill>
+              <a:latin typeface="+mj-lt"/>
+              <a:ea typeface="Verdana" panose="020B0604030504040204" pitchFamily="34" charset="0"/>
+            </a:endParaRPr>
+          </a:p>
+          <a:p>
+            <a:pPr algn="ctr"/>
+            <a:r>
+              <a:rPr lang="en-US" sz="1200" b="1" dirty="0">
+                <a:solidFill>
+                  <a:schemeClr val="tx1"/>
+                </a:solidFill>
+                <a:latin typeface="+mj-lt"/>
+                <a:ea typeface="Verdana" panose="020B0604030504040204" pitchFamily="34" charset="0"/>
+              </a:rPr>
+              <a:t>EDA</a:t>
+            </a:r>
+          </a:p>
+        </p:txBody>
+      </p:sp>
+      <p:sp>
+        <p:nvSpPr>
+          <p:cNvPr id="10" name="Rectangle 9">
+            <a:extLst>
+              <a:ext uri="{FF2B5EF4-FFF2-40B4-BE49-F238E27FC236}">
+                <a16:creationId xmlns:a16="http://schemas.microsoft.com/office/drawing/2014/main" id="{82CB8E96-1B51-4B3A-9F7F-659CBA34B6FC}"/>
+              </a:ext>
+            </a:extLst>
+          </p:cNvPr>
+          <p:cNvSpPr/>
+          <p:nvPr/>
+        </p:nvSpPr>
+        <p:spPr>
+          <a:xfrm>
+            <a:off x="2220677" y="6058807"/>
+            <a:ext cx="907461" cy="661898"/>
+          </a:xfrm>
+          <a:prstGeom prst="rect">
+            <a:avLst/>
+          </a:prstGeom>
+        </p:spPr>
+        <p:style>
+          <a:lnRef idx="2">
+            <a:schemeClr val="accent1">
+              <a:shade val="50000"/>
+            </a:schemeClr>
+          </a:lnRef>
+          <a:fillRef idx="1">
+            <a:schemeClr val="accent1"/>
+          </a:fillRef>
+          <a:effectRef idx="0">
+            <a:schemeClr val="accent1"/>
+          </a:effectRef>
+          <a:fontRef idx="minor">
+            <a:schemeClr val="lt1"/>
+          </a:fontRef>
+        </p:style>
+        <p:txBody>
+          <a:bodyPr rtlCol="0" anchor="ctr"/>
+          <a:lstStyle/>
+          <a:p>
+            <a:pPr algn="ctr"/>
+            <a:r>
+              <a:rPr lang="en-US" sz="1200" b="1" dirty="0">
+                <a:solidFill>
+                  <a:schemeClr val="tx1"/>
+                </a:solidFill>
+              </a:rPr>
+              <a:t>HUD - 2</a:t>
+            </a:r>
+          </a:p>
+          <a:p>
+            <a:pPr algn="ctr"/>
+            <a:r>
+              <a:rPr lang="en-US" sz="1200" b="1" dirty="0">
+                <a:solidFill>
+                  <a:schemeClr val="tx1"/>
+                </a:solidFill>
+              </a:rPr>
+              <a:t>Feature Analysis</a:t>
+            </a:r>
+          </a:p>
+        </p:txBody>
+      </p:sp>
+      <p:sp>
+        <p:nvSpPr>
+          <p:cNvPr id="11" name="Rectangle 10">
+            <a:extLst>
+              <a:ext uri="{FF2B5EF4-FFF2-40B4-BE49-F238E27FC236}">
+                <a16:creationId xmlns:a16="http://schemas.microsoft.com/office/drawing/2014/main" id="{07F362F5-600B-4310-AAAE-6660EEC57AE4}"/>
+              </a:ext>
+            </a:extLst>
+          </p:cNvPr>
+          <p:cNvSpPr/>
+          <p:nvPr/>
+        </p:nvSpPr>
+        <p:spPr>
+          <a:xfrm>
+            <a:off x="3729863" y="6058807"/>
+            <a:ext cx="907461" cy="661898"/>
+          </a:xfrm>
+          <a:prstGeom prst="rect">
+            <a:avLst/>
+          </a:prstGeom>
+        </p:spPr>
+        <p:style>
+          <a:lnRef idx="2">
+            <a:schemeClr val="accent1">
+              <a:shade val="50000"/>
+            </a:schemeClr>
+          </a:lnRef>
+          <a:fillRef idx="1">
+            <a:schemeClr val="accent1"/>
+          </a:fillRef>
+          <a:effectRef idx="0">
+            <a:schemeClr val="accent1"/>
+          </a:effectRef>
+          <a:fontRef idx="minor">
+            <a:schemeClr val="lt1"/>
+          </a:fontRef>
+        </p:style>
+        <p:txBody>
+          <a:bodyPr rtlCol="0" anchor="ctr"/>
+          <a:lstStyle/>
+          <a:p>
+            <a:pPr algn="ctr"/>
+            <a:r>
+              <a:rPr lang="en-US" sz="1200" b="1" dirty="0">
+                <a:solidFill>
+                  <a:schemeClr val="tx1"/>
+                </a:solidFill>
+                <a:latin typeface="+mj-lt"/>
+                <a:ea typeface="Verdana" panose="020B0604030504040204" pitchFamily="34" charset="0"/>
+              </a:rPr>
+              <a:t>HUD - 3</a:t>
+            </a:r>
+          </a:p>
+          <a:p>
+            <a:pPr algn="ctr"/>
+            <a:r>
+              <a:rPr lang="en-US" sz="1200" b="1" dirty="0">
+                <a:solidFill>
+                  <a:schemeClr val="tx1"/>
+                </a:solidFill>
+                <a:latin typeface="+mj-lt"/>
+                <a:ea typeface="Verdana" panose="020B0604030504040204" pitchFamily="34" charset="0"/>
+              </a:rPr>
+              <a:t>CA</a:t>
+            </a:r>
+          </a:p>
+        </p:txBody>
+      </p:sp>
+      <p:cxnSp>
+        <p:nvCxnSpPr>
+          <p:cNvPr id="12" name="Connector: Elbow 11">
+            <a:extLst>
+              <a:ext uri="{FF2B5EF4-FFF2-40B4-BE49-F238E27FC236}">
+                <a16:creationId xmlns:a16="http://schemas.microsoft.com/office/drawing/2014/main" id="{855F72FB-0422-4516-951A-C007B7332D3D}"/>
+              </a:ext>
+            </a:extLst>
+          </p:cNvPr>
+          <p:cNvCxnSpPr>
+            <a:cxnSpLocks/>
+          </p:cNvCxnSpPr>
+          <p:nvPr/>
+        </p:nvCxnSpPr>
+        <p:spPr>
+          <a:xfrm rot="5400000">
+            <a:off x="1538356" y="4939691"/>
+            <a:ext cx="672547" cy="1565686"/>
+          </a:xfrm>
+          <a:prstGeom prst="bentConnector3">
+            <a:avLst/>
+          </a:prstGeom>
+          <a:ln>
+            <a:tailEnd type="triangle"/>
+          </a:ln>
+        </p:spPr>
+        <p:style>
+          <a:lnRef idx="1">
+            <a:schemeClr val="accent1"/>
+          </a:lnRef>
+          <a:fillRef idx="0">
+            <a:schemeClr val="accent1"/>
+          </a:fillRef>
+          <a:effectRef idx="0">
+            <a:schemeClr val="accent1"/>
+          </a:effectRef>
+          <a:fontRef idx="minor">
+            <a:schemeClr val="tx1"/>
+          </a:fontRef>
+        </p:style>
+      </p:cxnSp>
+      <p:cxnSp>
+        <p:nvCxnSpPr>
+          <p:cNvPr id="16" name="Connector: Elbow 15">
+            <a:extLst>
+              <a:ext uri="{FF2B5EF4-FFF2-40B4-BE49-F238E27FC236}">
+                <a16:creationId xmlns:a16="http://schemas.microsoft.com/office/drawing/2014/main" id="{3BFCF7BA-20F8-4521-97FA-BAFDCD606AFE}"/>
+              </a:ext>
+            </a:extLst>
+          </p:cNvPr>
+          <p:cNvCxnSpPr>
+            <a:stCxn id="5" idx="2"/>
+            <a:endCxn id="10" idx="0"/>
+          </p:cNvCxnSpPr>
+          <p:nvPr/>
+        </p:nvCxnSpPr>
+        <p:spPr>
+          <a:xfrm rot="16200000" flipH="1">
+            <a:off x="2332490" y="5716889"/>
+            <a:ext cx="672548" cy="11288"/>
+          </a:xfrm>
+          <a:prstGeom prst="bentConnector3">
+            <a:avLst/>
+          </a:prstGeom>
+          <a:ln>
+            <a:tailEnd type="triangle"/>
+          </a:ln>
+        </p:spPr>
+        <p:style>
+          <a:lnRef idx="1">
+            <a:schemeClr val="accent1"/>
+          </a:lnRef>
+          <a:fillRef idx="0">
+            <a:schemeClr val="accent1"/>
+          </a:fillRef>
+          <a:effectRef idx="0">
+            <a:schemeClr val="accent1"/>
+          </a:effectRef>
+          <a:fontRef idx="minor">
+            <a:schemeClr val="tx1"/>
+          </a:fontRef>
+        </p:style>
+      </p:cxnSp>
+      <p:cxnSp>
+        <p:nvCxnSpPr>
+          <p:cNvPr id="18" name="Connector: Elbow 17">
+            <a:extLst>
+              <a:ext uri="{FF2B5EF4-FFF2-40B4-BE49-F238E27FC236}">
+                <a16:creationId xmlns:a16="http://schemas.microsoft.com/office/drawing/2014/main" id="{1BE6912A-DD81-4359-8D77-D48F53E108D0}"/>
+              </a:ext>
+            </a:extLst>
+          </p:cNvPr>
+          <p:cNvCxnSpPr>
+            <a:stCxn id="5" idx="2"/>
+            <a:endCxn id="11" idx="0"/>
+          </p:cNvCxnSpPr>
+          <p:nvPr/>
+        </p:nvCxnSpPr>
+        <p:spPr>
+          <a:xfrm rot="16200000" flipH="1">
+            <a:off x="3087083" y="4962296"/>
+            <a:ext cx="672548" cy="1520474"/>
+          </a:xfrm>
+          <a:prstGeom prst="bentConnector3">
+            <a:avLst/>
+          </a:prstGeom>
+          <a:ln>
+            <a:tailEnd type="triangle"/>
+          </a:ln>
+        </p:spPr>
+        <p:style>
+          <a:lnRef idx="1">
+            <a:schemeClr val="accent1"/>
+          </a:lnRef>
+          <a:fillRef idx="0">
+            <a:schemeClr val="accent1"/>
+          </a:fillRef>
+          <a:effectRef idx="0">
+            <a:schemeClr val="accent1"/>
+          </a:effectRef>
+          <a:fontRef idx="minor">
+            <a:schemeClr val="tx1"/>
+          </a:fontRef>
+        </p:style>
+      </p:cxnSp>
+    </p:spTree>
+    <p:extLst>
+      <p:ext uri="{BB962C8B-B14F-4D97-AF65-F5344CB8AC3E}">
+        <p14:creationId xmlns:p14="http://schemas.microsoft.com/office/powerpoint/2010/main" val="4271347584"/>
+      </p:ext>
+    </p:extLst>
+  </p:cSld>
+  <p:clrMapOvr>
+    <a:masterClrMapping/>
+  </p:clrMapOvr>
+</p:sld>
+</file>
+
+<file path=ppt/slides/slide6.xml><?xml version="1.0" encoding="utf-8"?>
+<p:sld xmlns:a="http://schemas.openxmlformats.org/drawingml/2006/main" xmlns:r="http://schemas.openxmlformats.org/officeDocument/2006/relationships" xmlns:p="http://schemas.openxmlformats.org/presentationml/2006/main">
+  <p:cSld>
+    <p:spTree>
+      <p:nvGrpSpPr>
+        <p:cNvPr id="1" name=""/>
+        <p:cNvGrpSpPr/>
+        <p:nvPr/>
+      </p:nvGrpSpPr>
+      <p:grpSpPr>
+        <a:xfrm>
+          <a:off x="0" y="0"/>
+          <a:ext cx="0" cy="0"/>
+          <a:chOff x="0" y="0"/>
+          <a:chExt cx="0" cy="0"/>
+        </a:xfrm>
+      </p:grpSpPr>
+      <p:sp>
+        <p:nvSpPr>
+          <p:cNvPr id="6" name="Content Placeholder 5">
+            <a:extLst>
+              <a:ext uri="{FF2B5EF4-FFF2-40B4-BE49-F238E27FC236}">
+                <a16:creationId xmlns:a16="http://schemas.microsoft.com/office/drawing/2014/main" id="{05576148-748F-4B19-B0C5-7451CE605B41}"/>
+              </a:ext>
+            </a:extLst>
+          </p:cNvPr>
+          <p:cNvSpPr>
+            <a:spLocks noGrp="1"/>
+          </p:cNvSpPr>
+          <p:nvPr>
+            <p:ph idx="1"/>
+          </p:nvPr>
+        </p:nvSpPr>
+        <p:spPr/>
+        <p:txBody>
+          <a:bodyPr/>
+          <a:lstStyle/>
+          <a:p>
+            <a:r>
+              <a:rPr lang="en-US" dirty="0"/>
               <a:t>MDB team is aware that the initial data set may not be good enough to provide the final answer but will direct in the right direction. MDB team will have to eventually scrap more data and do transformations and using machine learning techniques to overcome the obstacles and be the **HERO ** for Harold.</a:t>
             </a:r>
           </a:p>
           <a:p>
+            <a:pPr marL="0" indent="0">
+              <a:buNone/>
+            </a:pPr>
             <a:r>
               <a:rPr lang="en-US" dirty="0"/>
               <a:t>HUD -1 answers the following key questions.</a:t>
@@ -8298,7 +9007,7 @@
     </p:spTree>
     <p:extLst>
       <p:ext uri="{BB962C8B-B14F-4D97-AF65-F5344CB8AC3E}">
-        <p14:creationId xmlns:p14="http://schemas.microsoft.com/office/powerpoint/2010/main" val="4271347584"/>
+        <p14:creationId xmlns:p14="http://schemas.microsoft.com/office/powerpoint/2010/main" val="3470708028"/>
       </p:ext>
     </p:extLst>
   </p:cSld>
@@ -8308,7 +9017,7 @@
 </p:sld>
 </file>
 
-<file path=ppt/slides/slide6.xml><?xml version="1.0" encoding="utf-8"?>
+<file path=ppt/slides/slide7.xml><?xml version="1.0" encoding="utf-8"?>
 <p:sld xmlns:a="http://schemas.openxmlformats.org/drawingml/2006/main" xmlns:r="http://schemas.openxmlformats.org/officeDocument/2006/relationships" xmlns:p="http://schemas.openxmlformats.org/presentationml/2006/main">
   <p:cSld>
     <p:spTree>
@@ -8446,7 +9155,7 @@
 </p:sld>
 </file>
 
-<file path=ppt/slides/slide7.xml><?xml version="1.0" encoding="utf-8"?>
+<file path=ppt/slides/slide8.xml><?xml version="1.0" encoding="utf-8"?>
 <p:sld xmlns:a="http://schemas.openxmlformats.org/drawingml/2006/main" xmlns:r="http://schemas.openxmlformats.org/officeDocument/2006/relationships" xmlns:p="http://schemas.openxmlformats.org/presentationml/2006/main">
   <p:cSld>
     <p:spTree>
@@ -8585,7 +9294,7 @@
 </p:sld>
 </file>
 
-<file path=ppt/slides/slide8.xml><?xml version="1.0" encoding="utf-8"?>
+<file path=ppt/slides/slide9.xml><?xml version="1.0" encoding="utf-8"?>
 <p:sld xmlns:a="http://schemas.openxmlformats.org/drawingml/2006/main" xmlns:r="http://schemas.openxmlformats.org/officeDocument/2006/relationships" xmlns:p="http://schemas.openxmlformats.org/presentationml/2006/main">
   <p:cSld>
     <p:spTree>
@@ -8734,161 +9443,6 @@
     <p:extLst>
       <p:ext uri="{BB962C8B-B14F-4D97-AF65-F5344CB8AC3E}">
         <p14:creationId xmlns:p14="http://schemas.microsoft.com/office/powerpoint/2010/main" val="2415652607"/>
-      </p:ext>
-    </p:extLst>
-  </p:cSld>
-  <p:clrMapOvr>
-    <a:masterClrMapping/>
-  </p:clrMapOvr>
-</p:sld>
-</file>
-
-<file path=ppt/slides/slide9.xml><?xml version="1.0" encoding="utf-8"?>
-<p:sld xmlns:a="http://schemas.openxmlformats.org/drawingml/2006/main" xmlns:r="http://schemas.openxmlformats.org/officeDocument/2006/relationships" xmlns:p="http://schemas.openxmlformats.org/presentationml/2006/main">
-  <p:cSld>
-    <p:spTree>
-      <p:nvGrpSpPr>
-        <p:cNvPr id="1" name=""/>
-        <p:cNvGrpSpPr/>
-        <p:nvPr/>
-      </p:nvGrpSpPr>
-      <p:grpSpPr>
-        <a:xfrm>
-          <a:off x="0" y="0"/>
-          <a:ext cx="0" cy="0"/>
-          <a:chOff x="0" y="0"/>
-          <a:chExt cx="0" cy="0"/>
-        </a:xfrm>
-      </p:grpSpPr>
-      <p:sp>
-        <p:nvSpPr>
-          <p:cNvPr id="4" name="Content Placeholder 3">
-            <a:extLst>
-              <a:ext uri="{FF2B5EF4-FFF2-40B4-BE49-F238E27FC236}">
-                <a16:creationId xmlns:a16="http://schemas.microsoft.com/office/drawing/2014/main" id="{D2213E38-3358-4888-93EA-37BCC5581424}"/>
-              </a:ext>
-            </a:extLst>
-          </p:cNvPr>
-          <p:cNvSpPr>
-            <a:spLocks noGrp="1"/>
-          </p:cNvSpPr>
-          <p:nvPr>
-            <p:ph idx="1"/>
-          </p:nvPr>
-        </p:nvSpPr>
-        <p:spPr/>
-        <p:txBody>
-          <a:bodyPr>
-            <a:normAutofit/>
-          </a:bodyPr>
-          <a:lstStyle/>
-          <a:p>
-            <a:pPr marL="0" indent="0" algn="ctr">
-              <a:buNone/>
-            </a:pPr>
-            <a:r>
-              <a:rPr lang="en-US" sz="2000" b="1" dirty="0"/>
-              <a:t>Recommendation </a:t>
-            </a:r>
-          </a:p>
-          <a:p>
-            <a:pPr>
-              <a:buFont typeface="Wingdings" panose="05000000000000000000" pitchFamily="2" charset="2"/>
-              <a:buChar char="v"/>
-            </a:pPr>
-            <a:r>
-              <a:rPr lang="en-US" sz="1600" dirty="0"/>
-              <a:t>Actor who is part of most of the movies in high earning movies but may not be lead actor. Tom hanks seems to be most dependable actor followed by Jennifer, confirming women power.</a:t>
-            </a:r>
-          </a:p>
-          <a:p>
-            <a:pPr>
-              <a:buFont typeface="Wingdings" panose="05000000000000000000" pitchFamily="2" charset="2"/>
-              <a:buChar char="v"/>
-            </a:pPr>
-            <a:endParaRPr lang="en-US" sz="1600" dirty="0"/>
-          </a:p>
-          <a:p>
-            <a:pPr marL="0" indent="0">
-              <a:buNone/>
-            </a:pPr>
-            <a:r>
-              <a:rPr lang="en-US" sz="1600" dirty="0"/>
-              <a:t> </a:t>
-            </a:r>
-          </a:p>
-          <a:p>
-            <a:endParaRPr lang="en-US" sz="1600" dirty="0"/>
-          </a:p>
-          <a:p>
-            <a:endParaRPr lang="en-US" sz="1600" dirty="0"/>
-          </a:p>
-        </p:txBody>
-      </p:sp>
-      <p:pic>
-        <p:nvPicPr>
-          <p:cNvPr id="6" name="Picture 5">
-            <a:extLst>
-              <a:ext uri="{FF2B5EF4-FFF2-40B4-BE49-F238E27FC236}">
-                <a16:creationId xmlns:a16="http://schemas.microsoft.com/office/drawing/2014/main" id="{898AECE2-4D37-4E85-9B16-8434E6D7A0B2}"/>
-              </a:ext>
-            </a:extLst>
-          </p:cNvPr>
-          <p:cNvPicPr>
-            <a:picLocks noChangeAspect="1"/>
-          </p:cNvPicPr>
-          <p:nvPr/>
-        </p:nvPicPr>
-        <p:blipFill>
-          <a:blip r:embed="rId2"/>
-          <a:stretch>
-            <a:fillRect/>
-          </a:stretch>
-        </p:blipFill>
-        <p:spPr>
-          <a:xfrm>
-            <a:off x="1036461" y="182033"/>
-            <a:ext cx="2933700" cy="1600200"/>
-          </a:xfrm>
-          <a:prstGeom prst="rect">
-            <a:avLst/>
-          </a:prstGeom>
-        </p:spPr>
-      </p:pic>
-      <p:pic>
-        <p:nvPicPr>
-          <p:cNvPr id="3" name="Picture 2">
-            <a:extLst>
-              <a:ext uri="{FF2B5EF4-FFF2-40B4-BE49-F238E27FC236}">
-                <a16:creationId xmlns:a16="http://schemas.microsoft.com/office/drawing/2014/main" id="{AC3C19C6-3550-4292-9CC8-6C7EB6050C40}"/>
-              </a:ext>
-            </a:extLst>
-          </p:cNvPr>
-          <p:cNvPicPr>
-            <a:picLocks noChangeAspect="1"/>
-          </p:cNvPicPr>
-          <p:nvPr/>
-        </p:nvPicPr>
-        <p:blipFill>
-          <a:blip r:embed="rId3"/>
-          <a:stretch>
-            <a:fillRect/>
-          </a:stretch>
-        </p:blipFill>
-        <p:spPr>
-          <a:xfrm>
-            <a:off x="564268" y="4572000"/>
-            <a:ext cx="5236785" cy="4220461"/>
-          </a:xfrm>
-          <a:prstGeom prst="rect">
-            <a:avLst/>
-          </a:prstGeom>
-        </p:spPr>
-      </p:pic>
-    </p:spTree>
-    <p:extLst>
-      <p:ext uri="{BB962C8B-B14F-4D97-AF65-F5344CB8AC3E}">
-        <p14:creationId xmlns:p14="http://schemas.microsoft.com/office/powerpoint/2010/main" val="1488732586"/>
       </p:ext>
     </p:extLst>
   </p:cSld>
@@ -9156,20 +9710,20 @@
 </file>
 
 <file path=customXml/item1.xml><?xml version="1.0" encoding="utf-8"?>
+<p:properties xmlns:p="http://schemas.microsoft.com/office/2006/metadata/properties" xmlns:xsi="http://www.w3.org/2001/XMLSchema-instance" xmlns:pc="http://schemas.microsoft.com/office/infopath/2007/PartnerControls">
+  <documentManagement>
+    <MediaServiceKeyPoints xmlns="ef88797d-310b-4d46-ad9c-0c23fa0c8d45" xsi:nil="true"/>
+  </documentManagement>
+</p:properties>
+</file>
+
+<file path=customXml/item2.xml><?xml version="1.0" encoding="utf-8"?>
 <?mso-contentType ?>
 <FormTemplates xmlns="http://schemas.microsoft.com/sharepoint/v3/contenttype/forms">
   <Display>DocumentLibraryForm</Display>
   <Edit>DocumentLibraryForm</Edit>
   <New>DocumentLibraryForm</New>
 </FormTemplates>
-</file>
-
-<file path=customXml/item2.xml><?xml version="1.0" encoding="utf-8"?>
-<p:properties xmlns:p="http://schemas.microsoft.com/office/2006/metadata/properties" xmlns:xsi="http://www.w3.org/2001/XMLSchema-instance" xmlns:pc="http://schemas.microsoft.com/office/infopath/2007/PartnerControls">
-  <documentManagement>
-    <MediaServiceKeyPoints xmlns="ef88797d-310b-4d46-ad9c-0c23fa0c8d45" xsi:nil="true"/>
-  </documentManagement>
-</p:properties>
 </file>
 
 <file path=customXml/item3.xml><?xml version="1.0" encoding="utf-8"?>
@@ -9396,19 +9950,19 @@
 </file>
 
 <file path=customXml/itemProps1.xml><?xml version="1.0" encoding="utf-8"?>
-<ds:datastoreItem xmlns:ds="http://schemas.openxmlformats.org/officeDocument/2006/customXml" ds:itemID="{01B9FE9E-4225-43A8-A8C9-61BAE9CED68F}">
+<ds:datastoreItem xmlns:ds="http://schemas.openxmlformats.org/officeDocument/2006/customXml" ds:itemID="{BD0E37F7-73A9-4D3D-9C26-F85A847C247A}">
   <ds:schemaRefs>
-    <ds:schemaRef ds:uri="http://schemas.microsoft.com/sharepoint/v3/contenttype/forms"/>
+    <ds:schemaRef ds:uri="http://schemas.microsoft.com/office/2006/metadata/properties"/>
+    <ds:schemaRef ds:uri="http://schemas.microsoft.com/office/infopath/2007/PartnerControls"/>
+    <ds:schemaRef ds:uri="ef88797d-310b-4d46-ad9c-0c23fa0c8d45"/>
   </ds:schemaRefs>
 </ds:datastoreItem>
 </file>
 
 <file path=customXml/itemProps2.xml><?xml version="1.0" encoding="utf-8"?>
-<ds:datastoreItem xmlns:ds="http://schemas.openxmlformats.org/officeDocument/2006/customXml" ds:itemID="{BD0E37F7-73A9-4D3D-9C26-F85A847C247A}">
+<ds:datastoreItem xmlns:ds="http://schemas.openxmlformats.org/officeDocument/2006/customXml" ds:itemID="{01B9FE9E-4225-43A8-A8C9-61BAE9CED68F}">
   <ds:schemaRefs>
-    <ds:schemaRef ds:uri="http://schemas.microsoft.com/office/2006/metadata/properties"/>
-    <ds:schemaRef ds:uri="http://schemas.microsoft.com/office/infopath/2007/PartnerControls"/>
-    <ds:schemaRef ds:uri="ef88797d-310b-4d46-ad9c-0c23fa0c8d45"/>
+    <ds:schemaRef ds:uri="http://schemas.microsoft.com/sharepoint/v3/contenttype/forms"/>
   </ds:schemaRefs>
 </ds:datastoreItem>
 </file>

</xml_diff>

<commit_message>
added places holder slides for powerpoint
</commit_message>
<xml_diff>
--- a/Documentation/MovieS.pptx
+++ b/Documentation/MovieS.pptx
@@ -11,11 +11,15 @@
     <p:sldId id="261" r:id="rId8"/>
     <p:sldId id="259" r:id="rId9"/>
     <p:sldId id="266" r:id="rId10"/>
-    <p:sldId id="260" r:id="rId11"/>
-    <p:sldId id="262" r:id="rId12"/>
-    <p:sldId id="263" r:id="rId13"/>
-    <p:sldId id="264" r:id="rId14"/>
-    <p:sldId id="265" r:id="rId15"/>
+    <p:sldId id="267" r:id="rId11"/>
+    <p:sldId id="260" r:id="rId12"/>
+    <p:sldId id="262" r:id="rId13"/>
+    <p:sldId id="263" r:id="rId14"/>
+    <p:sldId id="264" r:id="rId15"/>
+    <p:sldId id="265" r:id="rId16"/>
+    <p:sldId id="268" r:id="rId17"/>
+    <p:sldId id="270" r:id="rId18"/>
+    <p:sldId id="269" r:id="rId19"/>
   </p:sldIdLst>
   <p:sldSz cx="6858000" cy="9144000" type="letter"/>
   <p:notesSz cx="6858000" cy="9144000"/>
@@ -937,7 +941,7 @@
           <a:p>
             <a:fld id="{552E2C6F-EF9B-4B9B-9664-C8CFFD5D581A}" type="datetimeFigureOut">
               <a:rPr lang="en-US" smtClean="0"/>
-              <a:t>1/26/2022</a:t>
+              <a:t>1/26/22</a:t>
             </a:fld>
             <a:endParaRPr lang="en-US" dirty="0"/>
           </a:p>
@@ -1188,7 +1192,7 @@
           <a:p>
             <a:fld id="{552E2C6F-EF9B-4B9B-9664-C8CFFD5D581A}" type="datetimeFigureOut">
               <a:rPr lang="en-US" smtClean="0"/>
-              <a:t>1/26/2022</a:t>
+              <a:t>1/26/22</a:t>
             </a:fld>
             <a:endParaRPr lang="en-US" dirty="0"/>
           </a:p>
@@ -1502,7 +1506,7 @@
           <a:p>
             <a:fld id="{552E2C6F-EF9B-4B9B-9664-C8CFFD5D581A}" type="datetimeFigureOut">
               <a:rPr lang="en-US" smtClean="0"/>
-              <a:t>1/26/2022</a:t>
+              <a:t>1/26/22</a:t>
             </a:fld>
             <a:endParaRPr lang="en-US" dirty="0"/>
           </a:p>
@@ -1835,7 +1839,7 @@
           <a:p>
             <a:fld id="{552E2C6F-EF9B-4B9B-9664-C8CFFD5D581A}" type="datetimeFigureOut">
               <a:rPr lang="en-US" smtClean="0"/>
-              <a:t>1/26/2022</a:t>
+              <a:t>1/26/22</a:t>
             </a:fld>
             <a:endParaRPr lang="en-US" dirty="0"/>
           </a:p>
@@ -2149,7 +2153,7 @@
           <a:p>
             <a:fld id="{552E2C6F-EF9B-4B9B-9664-C8CFFD5D581A}" type="datetimeFigureOut">
               <a:rPr lang="en-US" smtClean="0"/>
-              <a:t>1/26/2022</a:t>
+              <a:t>1/26/22</a:t>
             </a:fld>
             <a:endParaRPr lang="en-US" dirty="0"/>
           </a:p>
@@ -2542,7 +2546,7 @@
           <a:p>
             <a:fld id="{552E2C6F-EF9B-4B9B-9664-C8CFFD5D581A}" type="datetimeFigureOut">
               <a:rPr lang="en-US" smtClean="0"/>
-              <a:t>1/26/2022</a:t>
+              <a:t>1/26/22</a:t>
             </a:fld>
             <a:endParaRPr lang="en-US" dirty="0"/>
           </a:p>
@@ -2712,7 +2716,7 @@
           <a:p>
             <a:fld id="{552E2C6F-EF9B-4B9B-9664-C8CFFD5D581A}" type="datetimeFigureOut">
               <a:rPr lang="en-US" smtClean="0"/>
-              <a:t>1/26/2022</a:t>
+              <a:t>1/26/22</a:t>
             </a:fld>
             <a:endParaRPr lang="en-US" dirty="0"/>
           </a:p>
@@ -2892,7 +2896,7 @@
           <a:p>
             <a:fld id="{552E2C6F-EF9B-4B9B-9664-C8CFFD5D581A}" type="datetimeFigureOut">
               <a:rPr lang="en-US" smtClean="0"/>
-              <a:t>1/26/2022</a:t>
+              <a:t>1/26/22</a:t>
             </a:fld>
             <a:endParaRPr lang="en-US" dirty="0"/>
           </a:p>
@@ -3947,7 +3951,7 @@
           <a:p>
             <a:fld id="{552E2C6F-EF9B-4B9B-9664-C8CFFD5D581A}" type="datetimeFigureOut">
               <a:rPr lang="en-US" smtClean="0"/>
-              <a:t>1/26/2022</a:t>
+              <a:t>1/26/22</a:t>
             </a:fld>
             <a:endParaRPr lang="en-US" dirty="0"/>
           </a:p>
@@ -4194,7 +4198,7 @@
           <a:p>
             <a:fld id="{552E2C6F-EF9B-4B9B-9664-C8CFFD5D581A}" type="datetimeFigureOut">
               <a:rPr lang="en-US" smtClean="0"/>
-              <a:t>1/26/2022</a:t>
+              <a:t>1/26/22</a:t>
             </a:fld>
             <a:endParaRPr lang="en-US" dirty="0"/>
           </a:p>
@@ -4491,7 +4495,7 @@
           <a:p>
             <a:fld id="{552E2C6F-EF9B-4B9B-9664-C8CFFD5D581A}" type="datetimeFigureOut">
               <a:rPr lang="en-US" smtClean="0"/>
-              <a:t>1/26/2022</a:t>
+              <a:t>1/26/22</a:t>
             </a:fld>
             <a:endParaRPr lang="en-US" dirty="0"/>
           </a:p>
@@ -4870,7 +4874,7 @@
           <a:p>
             <a:fld id="{552E2C6F-EF9B-4B9B-9664-C8CFFD5D581A}" type="datetimeFigureOut">
               <a:rPr lang="en-US" smtClean="0"/>
-              <a:t>1/26/2022</a:t>
+              <a:t>1/26/22</a:t>
             </a:fld>
             <a:endParaRPr lang="en-US" dirty="0"/>
           </a:p>
@@ -4993,7 +4997,7 @@
           <a:p>
             <a:fld id="{552E2C6F-EF9B-4B9B-9664-C8CFFD5D581A}" type="datetimeFigureOut">
               <a:rPr lang="en-US" smtClean="0"/>
-              <a:t>1/26/2022</a:t>
+              <a:t>1/26/22</a:t>
             </a:fld>
             <a:endParaRPr lang="en-US" dirty="0"/>
           </a:p>
@@ -5088,7 +5092,7 @@
           <a:p>
             <a:fld id="{2E975E58-1529-4942-85D9-4437A17B2BE2}" type="datetimeFigureOut">
               <a:rPr lang="en-US" smtClean="0"/>
-              <a:t>1/26/2022</a:t>
+              <a:t>1/26/22</a:t>
             </a:fld>
             <a:endParaRPr lang="en-US"/>
           </a:p>
@@ -5343,7 +5347,7 @@
           <a:p>
             <a:fld id="{552E2C6F-EF9B-4B9B-9664-C8CFFD5D581A}" type="datetimeFigureOut">
               <a:rPr lang="en-US" smtClean="0"/>
-              <a:t>1/26/2022</a:t>
+              <a:t>1/26/22</a:t>
             </a:fld>
             <a:endParaRPr lang="en-US" dirty="0"/>
           </a:p>
@@ -5606,7 +5610,7 @@
           <a:p>
             <a:fld id="{552E2C6F-EF9B-4B9B-9664-C8CFFD5D581A}" type="datetimeFigureOut">
               <a:rPr lang="en-US" smtClean="0"/>
-              <a:t>1/26/2022</a:t>
+              <a:t>1/26/22</a:t>
             </a:fld>
             <a:endParaRPr lang="en-US" dirty="0"/>
           </a:p>
@@ -6420,7 +6424,7 @@
           <a:p>
             <a:fld id="{552E2C6F-EF9B-4B9B-9664-C8CFFD5D581A}" type="datetimeFigureOut">
               <a:rPr lang="en-US" smtClean="0"/>
-              <a:t>1/26/2022</a:t>
+              <a:t>1/26/22</a:t>
             </a:fld>
             <a:endParaRPr lang="en-US" dirty="0"/>
           </a:p>
@@ -7229,6 +7233,164 @@
             </a:pPr>
             <a:r>
               <a:rPr lang="en-US" sz="1600" dirty="0"/>
+              <a:t>Actor/Actress do provide some lead into the earnings.</a:t>
+            </a:r>
+          </a:p>
+          <a:p>
+            <a:pPr>
+              <a:buFont typeface="Wingdings" panose="05000000000000000000" pitchFamily="2" charset="2"/>
+              <a:buChar char="v"/>
+            </a:pPr>
+            <a:r>
+              <a:rPr lang="en-US" sz="1600" dirty="0"/>
+              <a:t>Critical finding is that women actors can lead to higher earnings.</a:t>
+            </a:r>
+          </a:p>
+          <a:p>
+            <a:pPr marL="0" indent="0">
+              <a:buNone/>
+            </a:pPr>
+            <a:r>
+              <a:rPr lang="en-US" sz="1600" dirty="0"/>
+              <a:t> </a:t>
+            </a:r>
+          </a:p>
+          <a:p>
+            <a:endParaRPr lang="en-US" sz="1600" dirty="0"/>
+          </a:p>
+          <a:p>
+            <a:endParaRPr lang="en-US" sz="1600" dirty="0"/>
+          </a:p>
+        </p:txBody>
+      </p:sp>
+      <p:pic>
+        <p:nvPicPr>
+          <p:cNvPr id="6" name="Picture 5">
+            <a:extLst>
+              <a:ext uri="{FF2B5EF4-FFF2-40B4-BE49-F238E27FC236}">
+                <a16:creationId xmlns:a16="http://schemas.microsoft.com/office/drawing/2014/main" id="{898AECE2-4D37-4E85-9B16-8434E6D7A0B2}"/>
+              </a:ext>
+            </a:extLst>
+          </p:cNvPr>
+          <p:cNvPicPr>
+            <a:picLocks noChangeAspect="1"/>
+          </p:cNvPicPr>
+          <p:nvPr/>
+        </p:nvPicPr>
+        <p:blipFill>
+          <a:blip r:embed="rId2"/>
+          <a:stretch>
+            <a:fillRect/>
+          </a:stretch>
+        </p:blipFill>
+        <p:spPr>
+          <a:xfrm>
+            <a:off x="1036461" y="182033"/>
+            <a:ext cx="2933700" cy="1600200"/>
+          </a:xfrm>
+          <a:prstGeom prst="rect">
+            <a:avLst/>
+          </a:prstGeom>
+        </p:spPr>
+      </p:pic>
+      <p:pic>
+        <p:nvPicPr>
+          <p:cNvPr id="5" name="Picture 4">
+            <a:extLst>
+              <a:ext uri="{FF2B5EF4-FFF2-40B4-BE49-F238E27FC236}">
+                <a16:creationId xmlns:a16="http://schemas.microsoft.com/office/drawing/2014/main" id="{1C940EDD-9443-480A-AF9B-B54E4E99F212}"/>
+              </a:ext>
+            </a:extLst>
+          </p:cNvPr>
+          <p:cNvPicPr>
+            <a:picLocks noChangeAspect="1"/>
+          </p:cNvPicPr>
+          <p:nvPr/>
+        </p:nvPicPr>
+        <p:blipFill>
+          <a:blip r:embed="rId3"/>
+          <a:stretch>
+            <a:fillRect/>
+          </a:stretch>
+        </p:blipFill>
+        <p:spPr>
+          <a:xfrm>
+            <a:off x="307318" y="4572000"/>
+            <a:ext cx="4910667" cy="4412964"/>
+          </a:xfrm>
+          <a:prstGeom prst="rect">
+            <a:avLst/>
+          </a:prstGeom>
+        </p:spPr>
+      </p:pic>
+    </p:spTree>
+    <p:extLst>
+      <p:ext uri="{BB962C8B-B14F-4D97-AF65-F5344CB8AC3E}">
+        <p14:creationId xmlns:p14="http://schemas.microsoft.com/office/powerpoint/2010/main" val="2415652607"/>
+      </p:ext>
+    </p:extLst>
+  </p:cSld>
+  <p:clrMapOvr>
+    <a:masterClrMapping/>
+  </p:clrMapOvr>
+</p:sld>
+</file>
+
+<file path=ppt/slides/slide11.xml><?xml version="1.0" encoding="utf-8"?>
+<p:sld xmlns:a="http://schemas.openxmlformats.org/drawingml/2006/main" xmlns:r="http://schemas.openxmlformats.org/officeDocument/2006/relationships" xmlns:p="http://schemas.openxmlformats.org/presentationml/2006/main">
+  <p:cSld>
+    <p:spTree>
+      <p:nvGrpSpPr>
+        <p:cNvPr id="1" name=""/>
+        <p:cNvGrpSpPr/>
+        <p:nvPr/>
+      </p:nvGrpSpPr>
+      <p:grpSpPr>
+        <a:xfrm>
+          <a:off x="0" y="0"/>
+          <a:ext cx="0" cy="0"/>
+          <a:chOff x="0" y="0"/>
+          <a:chExt cx="0" cy="0"/>
+        </a:xfrm>
+      </p:grpSpPr>
+      <p:sp>
+        <p:nvSpPr>
+          <p:cNvPr id="4" name="Content Placeholder 3">
+            <a:extLst>
+              <a:ext uri="{FF2B5EF4-FFF2-40B4-BE49-F238E27FC236}">
+                <a16:creationId xmlns:a16="http://schemas.microsoft.com/office/drawing/2014/main" id="{D2213E38-3358-4888-93EA-37BCC5581424}"/>
+              </a:ext>
+            </a:extLst>
+          </p:cNvPr>
+          <p:cNvSpPr>
+            <a:spLocks noGrp="1"/>
+          </p:cNvSpPr>
+          <p:nvPr>
+            <p:ph idx="1"/>
+          </p:nvPr>
+        </p:nvSpPr>
+        <p:spPr/>
+        <p:txBody>
+          <a:bodyPr>
+            <a:normAutofit/>
+          </a:bodyPr>
+          <a:lstStyle/>
+          <a:p>
+            <a:pPr marL="0" indent="0" algn="ctr">
+              <a:buNone/>
+            </a:pPr>
+            <a:r>
+              <a:rPr lang="en-US" sz="2000" b="1" dirty="0"/>
+              <a:t>Recommendation </a:t>
+            </a:r>
+          </a:p>
+          <a:p>
+            <a:pPr>
+              <a:buFont typeface="Wingdings" panose="05000000000000000000" pitchFamily="2" charset="2"/>
+              <a:buChar char="v"/>
+            </a:pPr>
+            <a:r>
+              <a:rPr lang="en-US" sz="1600" dirty="0"/>
               <a:t>Actor who is part of most of the movies in high earning movies but may not be lead actor. Tom hanks seems to be most dependable actor followed by Jennifer, confirming women power.</a:t>
             </a:r>
           </a:p>
@@ -7329,7 +7491,7 @@
 </p:sld>
 </file>
 
-<file path=ppt/slides/slide11.xml><?xml version="1.0" encoding="utf-8"?>
+<file path=ppt/slides/slide12.xml><?xml version="1.0" encoding="utf-8"?>
 <p:sld xmlns:a="http://schemas.openxmlformats.org/drawingml/2006/main" xmlns:r="http://schemas.openxmlformats.org/officeDocument/2006/relationships" xmlns:p="http://schemas.openxmlformats.org/presentationml/2006/main">
   <p:cSld>
     <p:spTree>
@@ -7465,6 +7627,381 @@
     <p:extLst>
       <p:ext uri="{BB962C8B-B14F-4D97-AF65-F5344CB8AC3E}">
         <p14:creationId xmlns:p14="http://schemas.microsoft.com/office/powerpoint/2010/main" val="675693731"/>
+      </p:ext>
+    </p:extLst>
+  </p:cSld>
+  <p:clrMapOvr>
+    <a:masterClrMapping/>
+  </p:clrMapOvr>
+</p:sld>
+</file>
+
+<file path=ppt/slides/slide13.xml><?xml version="1.0" encoding="utf-8"?>
+<p:sld xmlns:a="http://schemas.openxmlformats.org/drawingml/2006/main" xmlns:r="http://schemas.openxmlformats.org/officeDocument/2006/relationships" xmlns:p="http://schemas.openxmlformats.org/presentationml/2006/main">
+  <p:cSld>
+    <p:spTree>
+      <p:nvGrpSpPr>
+        <p:cNvPr id="1" name=""/>
+        <p:cNvGrpSpPr/>
+        <p:nvPr/>
+      </p:nvGrpSpPr>
+      <p:grpSpPr>
+        <a:xfrm>
+          <a:off x="0" y="0"/>
+          <a:ext cx="0" cy="0"/>
+          <a:chOff x="0" y="0"/>
+          <a:chExt cx="0" cy="0"/>
+        </a:xfrm>
+      </p:grpSpPr>
+      <p:sp>
+        <p:nvSpPr>
+          <p:cNvPr id="2" name="Title 1">
+            <a:extLst>
+              <a:ext uri="{FF2B5EF4-FFF2-40B4-BE49-F238E27FC236}">
+                <a16:creationId xmlns:a16="http://schemas.microsoft.com/office/drawing/2014/main" id="{02140CBE-A017-874C-8CBD-95D3C0AB8153}"/>
+              </a:ext>
+            </a:extLst>
+          </p:cNvPr>
+          <p:cNvSpPr>
+            <a:spLocks noGrp="1"/>
+          </p:cNvSpPr>
+          <p:nvPr>
+            <p:ph type="title"/>
+          </p:nvPr>
+        </p:nvSpPr>
+        <p:spPr/>
+        <p:txBody>
+          <a:bodyPr/>
+          <a:lstStyle/>
+          <a:p>
+            <a:r>
+              <a:rPr lang="en-US" dirty="0"/>
+              <a:t>Poster vs grossing revenue relationship and tickets sold for Top Grossing Movies in US</a:t>
+            </a:r>
+            <a:br>
+              <a:rPr lang="en-US" dirty="0"/>
+            </a:br>
+            <a:endParaRPr lang="en-US" dirty="0"/>
+          </a:p>
+        </p:txBody>
+      </p:sp>
+      <p:sp>
+        <p:nvSpPr>
+          <p:cNvPr id="3" name="Content Placeholder 2">
+            <a:extLst>
+              <a:ext uri="{FF2B5EF4-FFF2-40B4-BE49-F238E27FC236}">
+                <a16:creationId xmlns:a16="http://schemas.microsoft.com/office/drawing/2014/main" id="{0E6DE151-C365-384F-95D5-20978EDE181A}"/>
+              </a:ext>
+            </a:extLst>
+          </p:cNvPr>
+          <p:cNvSpPr>
+            <a:spLocks noGrp="1"/>
+          </p:cNvSpPr>
+          <p:nvPr>
+            <p:ph idx="1"/>
+          </p:nvPr>
+        </p:nvSpPr>
+        <p:spPr/>
+        <p:txBody>
+          <a:bodyPr/>
+          <a:lstStyle/>
+          <a:p>
+            <a:r>
+              <a:rPr lang="en-US" dirty="0"/>
+              <a:t>'Number of Faces' contain the amount of actors faces, doesn't count CGI characters, or characters with a mask covering their face, like Batman. Shrek and Toy Story are outliers for this data (everything else I checked to make sure it was accurate). </a:t>
+            </a:r>
+          </a:p>
+          <a:p>
+            <a:r>
+              <a:rPr lang="en-US" dirty="0"/>
+              <a:t>Recall: The Highest Grossers data lists the top grossing movie for each year based on the tickets sold for each movie during the course of that respective year and also its corresponding year 2019 valuation(adjusted for inflation), Only in North America</a:t>
+            </a:r>
+          </a:p>
+        </p:txBody>
+      </p:sp>
+    </p:spTree>
+    <p:extLst>
+      <p:ext uri="{BB962C8B-B14F-4D97-AF65-F5344CB8AC3E}">
+        <p14:creationId xmlns:p14="http://schemas.microsoft.com/office/powerpoint/2010/main" val="3813266993"/>
+      </p:ext>
+    </p:extLst>
+  </p:cSld>
+  <p:clrMapOvr>
+    <a:masterClrMapping/>
+  </p:clrMapOvr>
+</p:sld>
+</file>
+
+<file path=ppt/slides/slide14.xml><?xml version="1.0" encoding="utf-8"?>
+<p:sld xmlns:a="http://schemas.openxmlformats.org/drawingml/2006/main" xmlns:r="http://schemas.openxmlformats.org/officeDocument/2006/relationships" xmlns:p="http://schemas.openxmlformats.org/presentationml/2006/main">
+  <p:cSld>
+    <p:spTree>
+      <p:nvGrpSpPr>
+        <p:cNvPr id="1" name=""/>
+        <p:cNvGrpSpPr/>
+        <p:nvPr/>
+      </p:nvGrpSpPr>
+      <p:grpSpPr>
+        <a:xfrm>
+          <a:off x="0" y="0"/>
+          <a:ext cx="0" cy="0"/>
+          <a:chOff x="0" y="0"/>
+          <a:chExt cx="0" cy="0"/>
+        </a:xfrm>
+      </p:grpSpPr>
+      <p:sp>
+        <p:nvSpPr>
+          <p:cNvPr id="2" name="Title 1">
+            <a:extLst>
+              <a:ext uri="{FF2B5EF4-FFF2-40B4-BE49-F238E27FC236}">
+                <a16:creationId xmlns:a16="http://schemas.microsoft.com/office/drawing/2014/main" id="{70FBEB82-E1E1-DD46-B19B-7CC4A1434433}"/>
+              </a:ext>
+            </a:extLst>
+          </p:cNvPr>
+          <p:cNvSpPr>
+            <a:spLocks noGrp="1"/>
+          </p:cNvSpPr>
+          <p:nvPr>
+            <p:ph type="title"/>
+          </p:nvPr>
+        </p:nvSpPr>
+        <p:spPr/>
+        <p:txBody>
+          <a:bodyPr>
+            <a:normAutofit/>
+          </a:bodyPr>
+          <a:lstStyle/>
+          <a:p>
+            <a:r>
+              <a:rPr lang="en-US" dirty="0"/>
+              <a:t>Poster and </a:t>
+            </a:r>
+            <a:r>
+              <a:rPr lang="en-US" dirty="0" err="1"/>
+              <a:t>imdb</a:t>
+            </a:r>
+            <a:r>
+              <a:rPr lang="en-US" dirty="0"/>
+              <a:t> score vs grossing revenue relationship and tickets sold for Top Grossing Movies in US</a:t>
+            </a:r>
+          </a:p>
+        </p:txBody>
+      </p:sp>
+      <p:sp>
+        <p:nvSpPr>
+          <p:cNvPr id="3" name="Content Placeholder 2">
+            <a:extLst>
+              <a:ext uri="{FF2B5EF4-FFF2-40B4-BE49-F238E27FC236}">
+                <a16:creationId xmlns:a16="http://schemas.microsoft.com/office/drawing/2014/main" id="{B6CAD82D-8D1C-4B41-B498-E27A0ACC754F}"/>
+              </a:ext>
+            </a:extLst>
+          </p:cNvPr>
+          <p:cNvSpPr>
+            <a:spLocks noGrp="1"/>
+          </p:cNvSpPr>
+          <p:nvPr>
+            <p:ph idx="1"/>
+          </p:nvPr>
+        </p:nvSpPr>
+        <p:spPr/>
+        <p:txBody>
+          <a:bodyPr/>
+          <a:lstStyle/>
+          <a:p>
+            <a:r>
+              <a:rPr lang="en-US" dirty="0"/>
+              <a:t>Placeholder. </a:t>
+            </a:r>
+          </a:p>
+        </p:txBody>
+      </p:sp>
+    </p:spTree>
+    <p:extLst>
+      <p:ext uri="{BB962C8B-B14F-4D97-AF65-F5344CB8AC3E}">
+        <p14:creationId xmlns:p14="http://schemas.microsoft.com/office/powerpoint/2010/main" val="3455715435"/>
+      </p:ext>
+    </p:extLst>
+  </p:cSld>
+  <p:clrMapOvr>
+    <a:masterClrMapping/>
+  </p:clrMapOvr>
+</p:sld>
+</file>
+
+<file path=ppt/slides/slide15.xml><?xml version="1.0" encoding="utf-8"?>
+<p:sld xmlns:a="http://schemas.openxmlformats.org/drawingml/2006/main" xmlns:r="http://schemas.openxmlformats.org/officeDocument/2006/relationships" xmlns:p="http://schemas.openxmlformats.org/presentationml/2006/main">
+  <p:cSld>
+    <p:spTree>
+      <p:nvGrpSpPr>
+        <p:cNvPr id="1" name=""/>
+        <p:cNvGrpSpPr/>
+        <p:nvPr/>
+      </p:nvGrpSpPr>
+      <p:grpSpPr>
+        <a:xfrm>
+          <a:off x="0" y="0"/>
+          <a:ext cx="0" cy="0"/>
+          <a:chOff x="0" y="0"/>
+          <a:chExt cx="0" cy="0"/>
+        </a:xfrm>
+      </p:grpSpPr>
+      <p:sp>
+        <p:nvSpPr>
+          <p:cNvPr id="2" name="Title 1">
+            <a:extLst>
+              <a:ext uri="{FF2B5EF4-FFF2-40B4-BE49-F238E27FC236}">
+                <a16:creationId xmlns:a16="http://schemas.microsoft.com/office/drawing/2014/main" id="{9BE6DBF0-83E4-444A-A71C-73DE167B1708}"/>
+              </a:ext>
+            </a:extLst>
+          </p:cNvPr>
+          <p:cNvSpPr>
+            <a:spLocks noGrp="1"/>
+          </p:cNvSpPr>
+          <p:nvPr>
+            <p:ph type="title"/>
+          </p:nvPr>
+        </p:nvSpPr>
+        <p:spPr/>
+        <p:txBody>
+          <a:bodyPr/>
+          <a:lstStyle/>
+          <a:p>
+            <a:r>
+              <a:rPr lang="en-US" dirty="0"/>
+              <a:t>Poster and </a:t>
+            </a:r>
+            <a:r>
+              <a:rPr lang="en-US" dirty="0" err="1"/>
+              <a:t>imdb</a:t>
+            </a:r>
+            <a:r>
+              <a:rPr lang="en-US" dirty="0"/>
+              <a:t> score vs grossing revenue relationship and tickets sold for Top Grossing Movies in US (cont.)</a:t>
+            </a:r>
+          </a:p>
+        </p:txBody>
+      </p:sp>
+      <p:sp>
+        <p:nvSpPr>
+          <p:cNvPr id="3" name="Content Placeholder 2">
+            <a:extLst>
+              <a:ext uri="{FF2B5EF4-FFF2-40B4-BE49-F238E27FC236}">
+                <a16:creationId xmlns:a16="http://schemas.microsoft.com/office/drawing/2014/main" id="{8A670D53-267A-A64C-BA24-2964C41E0F6B}"/>
+              </a:ext>
+            </a:extLst>
+          </p:cNvPr>
+          <p:cNvSpPr>
+            <a:spLocks noGrp="1"/>
+          </p:cNvSpPr>
+          <p:nvPr>
+            <p:ph idx="1"/>
+          </p:nvPr>
+        </p:nvSpPr>
+        <p:spPr/>
+        <p:txBody>
+          <a:bodyPr/>
+          <a:lstStyle/>
+          <a:p>
+            <a:r>
+              <a:rPr lang="en-US" dirty="0"/>
+              <a:t>PLACEHOLDER</a:t>
+            </a:r>
+            <a:r>
+              <a:rPr lang="en-US" dirty="0">
+                <a:sym typeface="Wingdings" pitchFamily="2" charset="2"/>
+              </a:rPr>
+              <a:t>: (will edit)</a:t>
+            </a:r>
+            <a:endParaRPr lang="en-US" dirty="0"/>
+          </a:p>
+          <a:p>
+            <a:r>
+              <a:rPr lang="en-US" dirty="0"/>
+              <a:t>For the highest grossing films per year (US) you can see there is a positive correlation between every variable.</a:t>
+            </a:r>
+          </a:p>
+          <a:p>
+            <a:r>
+              <a:rPr lang="en-US" dirty="0"/>
+              <a:t>Specifically, the number of faces is most correlated with the total earning per year and the amount of tickets sold (total per year is without inflation which is what I'm referring to).</a:t>
+            </a:r>
+          </a:p>
+          <a:p>
+            <a:endParaRPr lang="en-US" dirty="0"/>
+          </a:p>
+          <a:p>
+            <a:r>
+              <a:rPr lang="en-US" dirty="0"/>
+              <a:t>There is also a SLIGHT positive correlation between the number of faces on the poster and the </a:t>
+            </a:r>
+            <a:r>
+              <a:rPr lang="en-US" dirty="0" err="1"/>
+              <a:t>imdb</a:t>
+            </a:r>
+            <a:r>
+              <a:rPr lang="en-US" dirty="0"/>
+              <a:t> score. So the number of faces on a poster could possibly influence the </a:t>
+            </a:r>
+            <a:r>
+              <a:rPr lang="en-US" dirty="0" err="1"/>
+              <a:t>imdb</a:t>
+            </a:r>
+            <a:r>
+              <a:rPr lang="en-US" dirty="0"/>
+              <a:t> score.  </a:t>
+            </a:r>
+          </a:p>
+          <a:p>
+            <a:endParaRPr lang="en-US" dirty="0"/>
+          </a:p>
+          <a:p>
+            <a:r>
+              <a:rPr lang="en-US" dirty="0"/>
+              <a:t>Additionally, it seems the </a:t>
+            </a:r>
+            <a:r>
+              <a:rPr lang="en-US" dirty="0" err="1"/>
+              <a:t>imdb</a:t>
+            </a:r>
+            <a:r>
+              <a:rPr lang="en-US" dirty="0"/>
+              <a:t> score has more to do with success than the number of faces on the poster.</a:t>
+            </a:r>
+          </a:p>
+          <a:p>
+            <a:r>
+              <a:rPr lang="en-US" dirty="0"/>
+              <a:t>The </a:t>
+            </a:r>
+            <a:r>
+              <a:rPr lang="en-US" dirty="0" err="1"/>
+              <a:t>imdb</a:t>
+            </a:r>
+            <a:r>
+              <a:rPr lang="en-US" dirty="0"/>
+              <a:t> score is more correlated with tickets sold than the number of faces on poster are.</a:t>
+            </a:r>
+          </a:p>
+          <a:p>
+            <a:r>
+              <a:rPr lang="en-US" dirty="0"/>
+              <a:t>My conclusion is, if there are more faces on the poster, and the </a:t>
+            </a:r>
+            <a:r>
+              <a:rPr lang="en-US" dirty="0" err="1"/>
+              <a:t>imdb</a:t>
+            </a:r>
+            <a:r>
+              <a:rPr lang="en-US" dirty="0"/>
+              <a:t> score is good then it results in more tickets sold and higher box office earnings.</a:t>
+            </a:r>
+          </a:p>
+        </p:txBody>
+      </p:sp>
+    </p:spTree>
+    <p:extLst>
+      <p:ext uri="{BB962C8B-B14F-4D97-AF65-F5344CB8AC3E}">
+        <p14:creationId xmlns:p14="http://schemas.microsoft.com/office/powerpoint/2010/main" val="836177933"/>
       </p:ext>
     </p:extLst>
   </p:cSld>
@@ -8189,7 +8726,9 @@
         </p:nvSpPr>
         <p:spPr/>
         <p:txBody>
-          <a:bodyPr/>
+          <a:bodyPr>
+            <a:normAutofit lnSpcReduction="10000"/>
+          </a:bodyPr>
           <a:lstStyle/>
           <a:p>
             <a:pPr marL="0" indent="0">
@@ -8239,6 +8778,15 @@
             <a:r>
               <a:rPr lang="en-US" dirty="0"/>
               <a:t>These data sets were chosen as it provides a good summary of key metrics and the second data set has information about Facebook likes for each of the actors, director and the movie.</a:t>
+            </a:r>
+          </a:p>
+          <a:p>
+            <a:pPr marL="0" indent="0">
+              <a:buNone/>
+            </a:pPr>
+            <a:r>
+              <a:rPr lang="en-US" dirty="0"/>
+              <a:t>The Highest Grossers data lists the top grossing movie for each year based on the tickets sold for each movie during the course of that respective year and also its corresponding year 2019 valuation(adjusted for inflation), Only in North America</a:t>
             </a:r>
           </a:p>
           <a:p>
@@ -8896,7 +9444,7 @@
             </a:pPr>
             <a:r>
               <a:rPr lang="en-US" dirty="0"/>
-              <a:t>Compare total box office compared to average price relationship.</a:t>
+              <a:t>Compare total box office and total tickets sold compared to average price relationship.</a:t>
             </a:r>
           </a:p>
           <a:p>
@@ -8926,7 +9474,15 @@
             </a:pPr>
             <a:r>
               <a:rPr lang="en-US" dirty="0"/>
-              <a:t>Poster vs grossing revenue relationship.</a:t>
+              <a:t>Poster vs grossing revenue </a:t>
+            </a:r>
+            <a:r>
+              <a:rPr lang="en-US"/>
+              <a:t>and tickets sold </a:t>
+            </a:r>
+            <a:r>
+              <a:rPr lang="en-US" dirty="0"/>
+              <a:t>relationship.</a:t>
             </a:r>
           </a:p>
           <a:p>
@@ -9018,6 +9574,118 @@
 </file>
 
 <file path=ppt/slides/slide7.xml><?xml version="1.0" encoding="utf-8"?>
+<p:sld xmlns:a="http://schemas.openxmlformats.org/drawingml/2006/main" xmlns:r="http://schemas.openxmlformats.org/officeDocument/2006/relationships" xmlns:p="http://schemas.openxmlformats.org/presentationml/2006/main">
+  <p:cSld>
+    <p:spTree>
+      <p:nvGrpSpPr>
+        <p:cNvPr id="1" name=""/>
+        <p:cNvGrpSpPr/>
+        <p:nvPr/>
+      </p:nvGrpSpPr>
+      <p:grpSpPr>
+        <a:xfrm>
+          <a:off x="0" y="0"/>
+          <a:ext cx="0" cy="0"/>
+          <a:chOff x="0" y="0"/>
+          <a:chExt cx="0" cy="0"/>
+        </a:xfrm>
+      </p:grpSpPr>
+      <p:sp>
+        <p:nvSpPr>
+          <p:cNvPr id="2" name="Title 1">
+            <a:extLst>
+              <a:ext uri="{FF2B5EF4-FFF2-40B4-BE49-F238E27FC236}">
+                <a16:creationId xmlns:a16="http://schemas.microsoft.com/office/drawing/2014/main" id="{DC277BAD-6367-E44B-B9E5-4BA01E87AFAB}"/>
+              </a:ext>
+            </a:extLst>
+          </p:cNvPr>
+          <p:cNvSpPr>
+            <a:spLocks noGrp="1"/>
+          </p:cNvSpPr>
+          <p:nvPr>
+            <p:ph type="title"/>
+          </p:nvPr>
+        </p:nvSpPr>
+        <p:spPr/>
+        <p:txBody>
+          <a:bodyPr/>
+          <a:lstStyle/>
+          <a:p>
+            <a:r>
+              <a:rPr lang="en-US" dirty="0"/>
+              <a:t>Compare total box office and total tickets sold compared to average price relationship</a:t>
+            </a:r>
+          </a:p>
+        </p:txBody>
+      </p:sp>
+      <p:sp>
+        <p:nvSpPr>
+          <p:cNvPr id="3" name="Content Placeholder 2">
+            <a:extLst>
+              <a:ext uri="{FF2B5EF4-FFF2-40B4-BE49-F238E27FC236}">
+                <a16:creationId xmlns:a16="http://schemas.microsoft.com/office/drawing/2014/main" id="{FF07750D-C0F7-FB42-AE32-08AB3A6B580C}"/>
+              </a:ext>
+            </a:extLst>
+          </p:cNvPr>
+          <p:cNvSpPr>
+            <a:spLocks noGrp="1"/>
+          </p:cNvSpPr>
+          <p:nvPr>
+            <p:ph idx="1"/>
+          </p:nvPr>
+        </p:nvSpPr>
+        <p:spPr/>
+        <p:txBody>
+          <a:bodyPr/>
+          <a:lstStyle/>
+          <a:p>
+            <a:r>
+              <a:rPr lang="en-US" dirty="0"/>
+              <a:t>As you can see average ticket price has a negative correlation with the amount of tickets sold.</a:t>
+            </a:r>
+          </a:p>
+          <a:p>
+            <a:r>
+              <a:rPr lang="en-US" dirty="0"/>
+              <a:t>As ticket prices get higher, less tickets are sold, which will be show below in scatter plot. </a:t>
+            </a:r>
+          </a:p>
+          <a:p>
+            <a:r>
+              <a:rPr lang="en-US" dirty="0"/>
+              <a:t>However, as ticket prices get higher, the total box office</a:t>
+            </a:r>
+          </a:p>
+          <a:p>
+            <a:r>
+              <a:rPr lang="en-US" dirty="0"/>
+              <a:t>Conclusion: Studios would rather have less consumers but have increased prices because the higher ticket price results in more money for the </a:t>
+            </a:r>
+            <a:r>
+              <a:rPr lang="en-US" dirty="0" err="1"/>
+              <a:t>studioe</a:t>
+            </a:r>
+            <a:r>
+              <a:rPr lang="en-US" dirty="0"/>
+              <a:t> goes up.</a:t>
+            </a:r>
+          </a:p>
+        </p:txBody>
+      </p:sp>
+    </p:spTree>
+    <p:extLst>
+      <p:ext uri="{BB962C8B-B14F-4D97-AF65-F5344CB8AC3E}">
+        <p14:creationId xmlns:p14="http://schemas.microsoft.com/office/powerpoint/2010/main" val="4100794189"/>
+      </p:ext>
+    </p:extLst>
+  </p:cSld>
+  <p:clrMapOvr>
+    <a:masterClrMapping/>
+  </p:clrMapOvr>
+</p:sld>
+</file>
+
+<file path=ppt/slides/slide8.xml><?xml version="1.0" encoding="utf-8"?>
 <p:sld xmlns:a="http://schemas.openxmlformats.org/drawingml/2006/main" xmlns:r="http://schemas.openxmlformats.org/officeDocument/2006/relationships" xmlns:p="http://schemas.openxmlformats.org/presentationml/2006/main">
   <p:cSld>
     <p:spTree>
@@ -9155,7 +9823,7 @@
 </p:sld>
 </file>
 
-<file path=ppt/slides/slide8.xml><?xml version="1.0" encoding="utf-8"?>
+<file path=ppt/slides/slide9.xml><?xml version="1.0" encoding="utf-8"?>
 <p:sld xmlns:a="http://schemas.openxmlformats.org/drawingml/2006/main" xmlns:r="http://schemas.openxmlformats.org/officeDocument/2006/relationships" xmlns:p="http://schemas.openxmlformats.org/presentationml/2006/main">
   <p:cSld>
     <p:spTree>
@@ -9285,164 +9953,6 @@
     <p:extLst>
       <p:ext uri="{BB962C8B-B14F-4D97-AF65-F5344CB8AC3E}">
         <p14:creationId xmlns:p14="http://schemas.microsoft.com/office/powerpoint/2010/main" val="2814313353"/>
-      </p:ext>
-    </p:extLst>
-  </p:cSld>
-  <p:clrMapOvr>
-    <a:masterClrMapping/>
-  </p:clrMapOvr>
-</p:sld>
-</file>
-
-<file path=ppt/slides/slide9.xml><?xml version="1.0" encoding="utf-8"?>
-<p:sld xmlns:a="http://schemas.openxmlformats.org/drawingml/2006/main" xmlns:r="http://schemas.openxmlformats.org/officeDocument/2006/relationships" xmlns:p="http://schemas.openxmlformats.org/presentationml/2006/main">
-  <p:cSld>
-    <p:spTree>
-      <p:nvGrpSpPr>
-        <p:cNvPr id="1" name=""/>
-        <p:cNvGrpSpPr/>
-        <p:nvPr/>
-      </p:nvGrpSpPr>
-      <p:grpSpPr>
-        <a:xfrm>
-          <a:off x="0" y="0"/>
-          <a:ext cx="0" cy="0"/>
-          <a:chOff x="0" y="0"/>
-          <a:chExt cx="0" cy="0"/>
-        </a:xfrm>
-      </p:grpSpPr>
-      <p:sp>
-        <p:nvSpPr>
-          <p:cNvPr id="4" name="Content Placeholder 3">
-            <a:extLst>
-              <a:ext uri="{FF2B5EF4-FFF2-40B4-BE49-F238E27FC236}">
-                <a16:creationId xmlns:a16="http://schemas.microsoft.com/office/drawing/2014/main" id="{D2213E38-3358-4888-93EA-37BCC5581424}"/>
-              </a:ext>
-            </a:extLst>
-          </p:cNvPr>
-          <p:cNvSpPr>
-            <a:spLocks noGrp="1"/>
-          </p:cNvSpPr>
-          <p:nvPr>
-            <p:ph idx="1"/>
-          </p:nvPr>
-        </p:nvSpPr>
-        <p:spPr/>
-        <p:txBody>
-          <a:bodyPr>
-            <a:normAutofit/>
-          </a:bodyPr>
-          <a:lstStyle/>
-          <a:p>
-            <a:pPr marL="0" indent="0" algn="ctr">
-              <a:buNone/>
-            </a:pPr>
-            <a:r>
-              <a:rPr lang="en-US" sz="2000" b="1" dirty="0"/>
-              <a:t>Recommendation </a:t>
-            </a:r>
-          </a:p>
-          <a:p>
-            <a:pPr>
-              <a:buFont typeface="Wingdings" panose="05000000000000000000" pitchFamily="2" charset="2"/>
-              <a:buChar char="v"/>
-            </a:pPr>
-            <a:r>
-              <a:rPr lang="en-US" sz="1600" dirty="0"/>
-              <a:t>Actor/Actress do provide some lead into the earnings.</a:t>
-            </a:r>
-          </a:p>
-          <a:p>
-            <a:pPr>
-              <a:buFont typeface="Wingdings" panose="05000000000000000000" pitchFamily="2" charset="2"/>
-              <a:buChar char="v"/>
-            </a:pPr>
-            <a:r>
-              <a:rPr lang="en-US" sz="1600" dirty="0"/>
-              <a:t>Critical finding is that women actors can lead to higher earnings.</a:t>
-            </a:r>
-          </a:p>
-          <a:p>
-            <a:pPr marL="0" indent="0">
-              <a:buNone/>
-            </a:pPr>
-            <a:r>
-              <a:rPr lang="en-US" sz="1600" dirty="0"/>
-              <a:t> </a:t>
-            </a:r>
-          </a:p>
-          <a:p>
-            <a:endParaRPr lang="en-US" sz="1600" dirty="0"/>
-          </a:p>
-          <a:p>
-            <a:endParaRPr lang="en-US" sz="1600" dirty="0"/>
-          </a:p>
-        </p:txBody>
-      </p:sp>
-      <p:pic>
-        <p:nvPicPr>
-          <p:cNvPr id="6" name="Picture 5">
-            <a:extLst>
-              <a:ext uri="{FF2B5EF4-FFF2-40B4-BE49-F238E27FC236}">
-                <a16:creationId xmlns:a16="http://schemas.microsoft.com/office/drawing/2014/main" id="{898AECE2-4D37-4E85-9B16-8434E6D7A0B2}"/>
-              </a:ext>
-            </a:extLst>
-          </p:cNvPr>
-          <p:cNvPicPr>
-            <a:picLocks noChangeAspect="1"/>
-          </p:cNvPicPr>
-          <p:nvPr/>
-        </p:nvPicPr>
-        <p:blipFill>
-          <a:blip r:embed="rId2"/>
-          <a:stretch>
-            <a:fillRect/>
-          </a:stretch>
-        </p:blipFill>
-        <p:spPr>
-          <a:xfrm>
-            <a:off x="1036461" y="182033"/>
-            <a:ext cx="2933700" cy="1600200"/>
-          </a:xfrm>
-          <a:prstGeom prst="rect">
-            <a:avLst/>
-          </a:prstGeom>
-        </p:spPr>
-      </p:pic>
-      <p:pic>
-        <p:nvPicPr>
-          <p:cNvPr id="5" name="Picture 4">
-            <a:extLst>
-              <a:ext uri="{FF2B5EF4-FFF2-40B4-BE49-F238E27FC236}">
-                <a16:creationId xmlns:a16="http://schemas.microsoft.com/office/drawing/2014/main" id="{1C940EDD-9443-480A-AF9B-B54E4E99F212}"/>
-              </a:ext>
-            </a:extLst>
-          </p:cNvPr>
-          <p:cNvPicPr>
-            <a:picLocks noChangeAspect="1"/>
-          </p:cNvPicPr>
-          <p:nvPr/>
-        </p:nvPicPr>
-        <p:blipFill>
-          <a:blip r:embed="rId3"/>
-          <a:stretch>
-            <a:fillRect/>
-          </a:stretch>
-        </p:blipFill>
-        <p:spPr>
-          <a:xfrm>
-            <a:off x="307318" y="4572000"/>
-            <a:ext cx="4910667" cy="4412964"/>
-          </a:xfrm>
-          <a:prstGeom prst="rect">
-            <a:avLst/>
-          </a:prstGeom>
-        </p:spPr>
-      </p:pic>
-    </p:spTree>
-    <p:extLst>
-      <p:ext uri="{BB962C8B-B14F-4D97-AF65-F5344CB8AC3E}">
-        <p14:creationId xmlns:p14="http://schemas.microsoft.com/office/powerpoint/2010/main" val="2415652607"/>
       </p:ext>
     </p:extLst>
   </p:cSld>
@@ -9710,20 +10220,20 @@
 </file>
 
 <file path=customXml/item1.xml><?xml version="1.0" encoding="utf-8"?>
-<p:properties xmlns:p="http://schemas.microsoft.com/office/2006/metadata/properties" xmlns:xsi="http://www.w3.org/2001/XMLSchema-instance" xmlns:pc="http://schemas.microsoft.com/office/infopath/2007/PartnerControls">
-  <documentManagement>
-    <MediaServiceKeyPoints xmlns="ef88797d-310b-4d46-ad9c-0c23fa0c8d45" xsi:nil="true"/>
-  </documentManagement>
-</p:properties>
-</file>
-
-<file path=customXml/item2.xml><?xml version="1.0" encoding="utf-8"?>
 <?mso-contentType ?>
 <FormTemplates xmlns="http://schemas.microsoft.com/sharepoint/v3/contenttype/forms">
   <Display>DocumentLibraryForm</Display>
   <Edit>DocumentLibraryForm</Edit>
   <New>DocumentLibraryForm</New>
 </FormTemplates>
+</file>
+
+<file path=customXml/item2.xml><?xml version="1.0" encoding="utf-8"?>
+<p:properties xmlns:p="http://schemas.microsoft.com/office/2006/metadata/properties" xmlns:xsi="http://www.w3.org/2001/XMLSchema-instance" xmlns:pc="http://schemas.microsoft.com/office/infopath/2007/PartnerControls">
+  <documentManagement>
+    <MediaServiceKeyPoints xmlns="ef88797d-310b-4d46-ad9c-0c23fa0c8d45" xsi:nil="true"/>
+  </documentManagement>
+</p:properties>
 </file>
 
 <file path=customXml/item3.xml><?xml version="1.0" encoding="utf-8"?>
@@ -9950,19 +10460,19 @@
 </file>
 
 <file path=customXml/itemProps1.xml><?xml version="1.0" encoding="utf-8"?>
+<ds:datastoreItem xmlns:ds="http://schemas.openxmlformats.org/officeDocument/2006/customXml" ds:itemID="{01B9FE9E-4225-43A8-A8C9-61BAE9CED68F}">
+  <ds:schemaRefs>
+    <ds:schemaRef ds:uri="http://schemas.microsoft.com/sharepoint/v3/contenttype/forms"/>
+  </ds:schemaRefs>
+</ds:datastoreItem>
+</file>
+
+<file path=customXml/itemProps2.xml><?xml version="1.0" encoding="utf-8"?>
 <ds:datastoreItem xmlns:ds="http://schemas.openxmlformats.org/officeDocument/2006/customXml" ds:itemID="{BD0E37F7-73A9-4D3D-9C26-F85A847C247A}">
   <ds:schemaRefs>
     <ds:schemaRef ds:uri="http://schemas.microsoft.com/office/2006/metadata/properties"/>
     <ds:schemaRef ds:uri="http://schemas.microsoft.com/office/infopath/2007/PartnerControls"/>
     <ds:schemaRef ds:uri="ef88797d-310b-4d46-ad9c-0c23fa0c8d45"/>
-  </ds:schemaRefs>
-</ds:datastoreItem>
-</file>
-
-<file path=customXml/itemProps2.xml><?xml version="1.0" encoding="utf-8"?>
-<ds:datastoreItem xmlns:ds="http://schemas.openxmlformats.org/officeDocument/2006/customXml" ds:itemID="{01B9FE9E-4225-43A8-A8C9-61BAE9CED68F}">
-  <ds:schemaRefs>
-    <ds:schemaRef ds:uri="http://schemas.microsoft.com/sharepoint/v3/contenttype/forms"/>
   </ds:schemaRefs>
 </ds:datastoreItem>
 </file>

</xml_diff>

<commit_message>
put images in folder, added slides, and fixed my personal notebook for presentaion
</commit_message>
<xml_diff>
--- a/Documentation/MovieS.pptx
+++ b/Documentation/MovieS.pptx
@@ -17,9 +17,8 @@
     <p:sldId id="263" r:id="rId14"/>
     <p:sldId id="264" r:id="rId15"/>
     <p:sldId id="265" r:id="rId16"/>
-    <p:sldId id="268" r:id="rId17"/>
-    <p:sldId id="270" r:id="rId18"/>
-    <p:sldId id="269" r:id="rId19"/>
+    <p:sldId id="270" r:id="rId17"/>
+    <p:sldId id="268" r:id="rId18"/>
   </p:sldIdLst>
   <p:sldSz cx="6858000" cy="9144000" type="letter"/>
   <p:notesSz cx="6858000" cy="9144000"/>
@@ -941,7 +940,7 @@
           <a:p>
             <a:fld id="{552E2C6F-EF9B-4B9B-9664-C8CFFD5D581A}" type="datetimeFigureOut">
               <a:rPr lang="en-US" smtClean="0"/>
-              <a:t>1/26/22</a:t>
+              <a:t>1/28/22</a:t>
             </a:fld>
             <a:endParaRPr lang="en-US" dirty="0"/>
           </a:p>
@@ -1192,7 +1191,7 @@
           <a:p>
             <a:fld id="{552E2C6F-EF9B-4B9B-9664-C8CFFD5D581A}" type="datetimeFigureOut">
               <a:rPr lang="en-US" smtClean="0"/>
-              <a:t>1/26/22</a:t>
+              <a:t>1/28/22</a:t>
             </a:fld>
             <a:endParaRPr lang="en-US" dirty="0"/>
           </a:p>
@@ -1506,7 +1505,7 @@
           <a:p>
             <a:fld id="{552E2C6F-EF9B-4B9B-9664-C8CFFD5D581A}" type="datetimeFigureOut">
               <a:rPr lang="en-US" smtClean="0"/>
-              <a:t>1/26/22</a:t>
+              <a:t>1/28/22</a:t>
             </a:fld>
             <a:endParaRPr lang="en-US" dirty="0"/>
           </a:p>
@@ -1839,7 +1838,7 @@
           <a:p>
             <a:fld id="{552E2C6F-EF9B-4B9B-9664-C8CFFD5D581A}" type="datetimeFigureOut">
               <a:rPr lang="en-US" smtClean="0"/>
-              <a:t>1/26/22</a:t>
+              <a:t>1/28/22</a:t>
             </a:fld>
             <a:endParaRPr lang="en-US" dirty="0"/>
           </a:p>
@@ -2153,7 +2152,7 @@
           <a:p>
             <a:fld id="{552E2C6F-EF9B-4B9B-9664-C8CFFD5D581A}" type="datetimeFigureOut">
               <a:rPr lang="en-US" smtClean="0"/>
-              <a:t>1/26/22</a:t>
+              <a:t>1/28/22</a:t>
             </a:fld>
             <a:endParaRPr lang="en-US" dirty="0"/>
           </a:p>
@@ -2546,7 +2545,7 @@
           <a:p>
             <a:fld id="{552E2C6F-EF9B-4B9B-9664-C8CFFD5D581A}" type="datetimeFigureOut">
               <a:rPr lang="en-US" smtClean="0"/>
-              <a:t>1/26/22</a:t>
+              <a:t>1/28/22</a:t>
             </a:fld>
             <a:endParaRPr lang="en-US" dirty="0"/>
           </a:p>
@@ -2716,7 +2715,7 @@
           <a:p>
             <a:fld id="{552E2C6F-EF9B-4B9B-9664-C8CFFD5D581A}" type="datetimeFigureOut">
               <a:rPr lang="en-US" smtClean="0"/>
-              <a:t>1/26/22</a:t>
+              <a:t>1/28/22</a:t>
             </a:fld>
             <a:endParaRPr lang="en-US" dirty="0"/>
           </a:p>
@@ -2896,7 +2895,7 @@
           <a:p>
             <a:fld id="{552E2C6F-EF9B-4B9B-9664-C8CFFD5D581A}" type="datetimeFigureOut">
               <a:rPr lang="en-US" smtClean="0"/>
-              <a:t>1/26/22</a:t>
+              <a:t>1/28/22</a:t>
             </a:fld>
             <a:endParaRPr lang="en-US" dirty="0"/>
           </a:p>
@@ -3951,7 +3950,7 @@
           <a:p>
             <a:fld id="{552E2C6F-EF9B-4B9B-9664-C8CFFD5D581A}" type="datetimeFigureOut">
               <a:rPr lang="en-US" smtClean="0"/>
-              <a:t>1/26/22</a:t>
+              <a:t>1/28/22</a:t>
             </a:fld>
             <a:endParaRPr lang="en-US" dirty="0"/>
           </a:p>
@@ -4198,7 +4197,7 @@
           <a:p>
             <a:fld id="{552E2C6F-EF9B-4B9B-9664-C8CFFD5D581A}" type="datetimeFigureOut">
               <a:rPr lang="en-US" smtClean="0"/>
-              <a:t>1/26/22</a:t>
+              <a:t>1/28/22</a:t>
             </a:fld>
             <a:endParaRPr lang="en-US" dirty="0"/>
           </a:p>
@@ -4495,7 +4494,7 @@
           <a:p>
             <a:fld id="{552E2C6F-EF9B-4B9B-9664-C8CFFD5D581A}" type="datetimeFigureOut">
               <a:rPr lang="en-US" smtClean="0"/>
-              <a:t>1/26/22</a:t>
+              <a:t>1/28/22</a:t>
             </a:fld>
             <a:endParaRPr lang="en-US" dirty="0"/>
           </a:p>
@@ -4874,7 +4873,7 @@
           <a:p>
             <a:fld id="{552E2C6F-EF9B-4B9B-9664-C8CFFD5D581A}" type="datetimeFigureOut">
               <a:rPr lang="en-US" smtClean="0"/>
-              <a:t>1/26/22</a:t>
+              <a:t>1/28/22</a:t>
             </a:fld>
             <a:endParaRPr lang="en-US" dirty="0"/>
           </a:p>
@@ -4997,7 +4996,7 @@
           <a:p>
             <a:fld id="{552E2C6F-EF9B-4B9B-9664-C8CFFD5D581A}" type="datetimeFigureOut">
               <a:rPr lang="en-US" smtClean="0"/>
-              <a:t>1/26/22</a:t>
+              <a:t>1/28/22</a:t>
             </a:fld>
             <a:endParaRPr lang="en-US" dirty="0"/>
           </a:p>
@@ -5092,7 +5091,7 @@
           <a:p>
             <a:fld id="{2E975E58-1529-4942-85D9-4437A17B2BE2}" type="datetimeFigureOut">
               <a:rPr lang="en-US" smtClean="0"/>
-              <a:t>1/26/22</a:t>
+              <a:t>1/28/22</a:t>
             </a:fld>
             <a:endParaRPr lang="en-US"/>
           </a:p>
@@ -5347,7 +5346,7 @@
           <a:p>
             <a:fld id="{552E2C6F-EF9B-4B9B-9664-C8CFFD5D581A}" type="datetimeFigureOut">
               <a:rPr lang="en-US" smtClean="0"/>
-              <a:t>1/26/22</a:t>
+              <a:t>1/28/22</a:t>
             </a:fld>
             <a:endParaRPr lang="en-US" dirty="0"/>
           </a:p>
@@ -5610,7 +5609,7 @@
           <a:p>
             <a:fld id="{552E2C6F-EF9B-4B9B-9664-C8CFFD5D581A}" type="datetimeFigureOut">
               <a:rPr lang="en-US" smtClean="0"/>
-              <a:t>1/26/22</a:t>
+              <a:t>1/28/22</a:t>
             </a:fld>
             <a:endParaRPr lang="en-US" dirty="0"/>
           </a:p>
@@ -6424,7 +6423,7 @@
           <a:p>
             <a:fld id="{552E2C6F-EF9B-4B9B-9664-C8CFFD5D581A}" type="datetimeFigureOut">
               <a:rPr lang="en-US" smtClean="0"/>
-              <a:t>1/26/22</a:t>
+              <a:t>1/28/22</a:t>
             </a:fld>
             <a:endParaRPr lang="en-US" dirty="0"/>
           </a:p>
@@ -7658,7 +7657,7 @@
           <p:cNvPr id="2" name="Title 1">
             <a:extLst>
               <a:ext uri="{FF2B5EF4-FFF2-40B4-BE49-F238E27FC236}">
-                <a16:creationId xmlns:a16="http://schemas.microsoft.com/office/drawing/2014/main" id="{02140CBE-A017-874C-8CBD-95D3C0AB8153}"/>
+                <a16:creationId xmlns:a16="http://schemas.microsoft.com/office/drawing/2014/main" id="{70FBEB82-E1E1-DD46-B19B-7CC4A1434433}"/>
               </a:ext>
             </a:extLst>
           </p:cNvPr>
@@ -7669,19 +7668,30 @@
             <p:ph type="title"/>
           </p:nvPr>
         </p:nvSpPr>
-        <p:spPr/>
-        <p:txBody>
-          <a:bodyPr/>
+        <p:spPr>
+          <a:xfrm>
+            <a:off x="457199" y="501031"/>
+            <a:ext cx="4760785" cy="1761067"/>
+          </a:xfrm>
+        </p:spPr>
+        <p:txBody>
+          <a:bodyPr>
+            <a:normAutofit/>
+          </a:bodyPr>
           <a:lstStyle/>
           <a:p>
             <a:r>
               <a:rPr lang="en-US" dirty="0"/>
-              <a:t>Poster vs grossing revenue relationship and tickets sold for Top Grossing Movies in US</a:t>
-            </a:r>
-            <a:br>
+              <a:t>Poster and </a:t>
+            </a:r>
+            <a:r>
+              <a:rPr lang="en-US" dirty="0" err="1"/>
+              <a:t>imdb</a:t>
+            </a:r>
+            <a:r>
               <a:rPr lang="en-US" dirty="0"/>
-            </a:br>
-            <a:endParaRPr lang="en-US" dirty="0"/>
+              <a:t> score vs grossing revenue relationship and tickets sold for Top Grossing Movies in US</a:t>
+            </a:r>
           </a:p>
         </p:txBody>
       </p:sp>
@@ -7690,7 +7700,7 @@
           <p:cNvPr id="3" name="Content Placeholder 2">
             <a:extLst>
               <a:ext uri="{FF2B5EF4-FFF2-40B4-BE49-F238E27FC236}">
-                <a16:creationId xmlns:a16="http://schemas.microsoft.com/office/drawing/2014/main" id="{0E6DE151-C365-384F-95D5-20978EDE181A}"/>
+                <a16:creationId xmlns:a16="http://schemas.microsoft.com/office/drawing/2014/main" id="{B6CAD82D-8D1C-4B41-B498-E27A0ACC754F}"/>
               </a:ext>
             </a:extLst>
           </p:cNvPr>
@@ -7701,15 +7711,19 @@
             <p:ph idx="1"/>
           </p:nvPr>
         </p:nvSpPr>
-        <p:spPr/>
-        <p:txBody>
-          <a:bodyPr/>
+        <p:spPr>
+          <a:xfrm>
+            <a:off x="457199" y="2368446"/>
+            <a:ext cx="4760786" cy="5686705"/>
+          </a:xfrm>
+        </p:spPr>
+        <p:txBody>
+          <a:bodyPr>
+            <a:normAutofit lnSpcReduction="10000"/>
+          </a:bodyPr>
           <a:lstStyle/>
           <a:p>
-            <a:r>
-              <a:rPr lang="en-US" dirty="0"/>
-              <a:t>'Number of Faces' contain the amount of actors faces, doesn't count CGI characters, or characters with a mask covering their face, like Batman. Shrek and Toy Story are outliers for this data (everything else I checked to make sure it was accurate). </a:t>
-            </a:r>
+            <a:endParaRPr lang="en-US" dirty="0"/>
           </a:p>
           <a:p>
             <a:r>
@@ -7717,12 +7731,102 @@
               <a:t>Recall: The Highest Grossers data lists the top grossing movie for each year based on the tickets sold for each movie during the course of that respective year and also its corresponding year 2019 valuation(adjusted for inflation), Only in North America</a:t>
             </a:r>
           </a:p>
-        </p:txBody>
-      </p:sp>
+          <a:p>
+            <a:endParaRPr lang="en-US" dirty="0"/>
+          </a:p>
+          <a:p>
+            <a:endParaRPr lang="en-US" dirty="0"/>
+          </a:p>
+          <a:p>
+            <a:endParaRPr lang="en-US" dirty="0"/>
+          </a:p>
+          <a:p>
+            <a:endParaRPr lang="en-US" dirty="0"/>
+          </a:p>
+          <a:p>
+            <a:endParaRPr lang="en-US" dirty="0"/>
+          </a:p>
+          <a:p>
+            <a:endParaRPr lang="en-US" dirty="0"/>
+          </a:p>
+          <a:p>
+            <a:r>
+              <a:rPr lang="en-US" dirty="0"/>
+              <a:t>'Number of Faces' contain the amount of actor’s faces on the theatrical poster. This doesn't count CGI characters, or characters with a mask covering their face, like Batman. Shrek and Toy Story are outliers for this data (everything else I checked to make sure it was accurate). </a:t>
+            </a:r>
+          </a:p>
+          <a:p>
+            <a:r>
+              <a:rPr lang="en-US" dirty="0"/>
+              <a:t>For the highest grossing films per year (US) you can see there is a positive correlation between every variable.</a:t>
+            </a:r>
+          </a:p>
+          <a:p>
+            <a:r>
+              <a:rPr lang="en-US" dirty="0"/>
+              <a:t>Specifically, the number of faces is most correlated with the total earning per year and the amount of tickets sold (total per year is without inflation which is what I'm referring to).</a:t>
+            </a:r>
+          </a:p>
+          <a:p>
+            <a:endParaRPr lang="en-US" dirty="0"/>
+          </a:p>
+          <a:p>
+            <a:endParaRPr lang="en-US" dirty="0"/>
+          </a:p>
+          <a:p>
+            <a:endParaRPr lang="en-US" dirty="0"/>
+          </a:p>
+          <a:p>
+            <a:endParaRPr lang="en-US" dirty="0"/>
+          </a:p>
+          <a:p>
+            <a:endParaRPr lang="en-US" dirty="0"/>
+          </a:p>
+          <a:p>
+            <a:endParaRPr lang="en-US" dirty="0"/>
+          </a:p>
+          <a:p>
+            <a:endParaRPr lang="en-US" dirty="0"/>
+          </a:p>
+          <a:p>
+            <a:endParaRPr lang="en-US" dirty="0"/>
+          </a:p>
+        </p:txBody>
+      </p:sp>
+      <p:pic>
+        <p:nvPicPr>
+          <p:cNvPr id="7" name="Picture 6">
+            <a:extLst>
+              <a:ext uri="{FF2B5EF4-FFF2-40B4-BE49-F238E27FC236}">
+                <a16:creationId xmlns:a16="http://schemas.microsoft.com/office/drawing/2014/main" id="{D95DDFBB-D346-8A44-B2EC-554AC9D3A923}"/>
+              </a:ext>
+            </a:extLst>
+          </p:cNvPr>
+          <p:cNvPicPr>
+            <a:picLocks noChangeAspect="1"/>
+          </p:cNvPicPr>
+          <p:nvPr/>
+        </p:nvPicPr>
+        <p:blipFill>
+          <a:blip r:embed="rId2"/>
+          <a:stretch>
+            <a:fillRect/>
+          </a:stretch>
+        </p:blipFill>
+        <p:spPr>
+          <a:xfrm>
+            <a:off x="0" y="3771326"/>
+            <a:ext cx="6858000" cy="1440472"/>
+          </a:xfrm>
+          <a:prstGeom prst="rect">
+            <a:avLst/>
+          </a:prstGeom>
+        </p:spPr>
+      </p:pic>
     </p:spTree>
     <p:extLst>
       <p:ext uri="{BB962C8B-B14F-4D97-AF65-F5344CB8AC3E}">
-        <p14:creationId xmlns:p14="http://schemas.microsoft.com/office/powerpoint/2010/main" val="3813266993"/>
+        <p14:creationId xmlns:p14="http://schemas.microsoft.com/office/powerpoint/2010/main" val="3455715435"/>
       </p:ext>
     </p:extLst>
   </p:cSld>
@@ -7754,7 +7858,7 @@
           <p:cNvPr id="2" name="Title 1">
             <a:extLst>
               <a:ext uri="{FF2B5EF4-FFF2-40B4-BE49-F238E27FC236}">
-                <a16:creationId xmlns:a16="http://schemas.microsoft.com/office/drawing/2014/main" id="{70FBEB82-E1E1-DD46-B19B-7CC4A1434433}"/>
+                <a16:creationId xmlns:a16="http://schemas.microsoft.com/office/drawing/2014/main" id="{02140CBE-A017-874C-8CBD-95D3C0AB8153}"/>
               </a:ext>
             </a:extLst>
           </p:cNvPr>
@@ -7765,7 +7869,12 @@
             <p:ph type="title"/>
           </p:nvPr>
         </p:nvSpPr>
-        <p:spPr/>
+        <p:spPr>
+          <a:xfrm>
+            <a:off x="457199" y="254833"/>
+            <a:ext cx="4760785" cy="1690557"/>
+          </a:xfrm>
+        </p:spPr>
         <p:txBody>
           <a:bodyPr>
             <a:normAutofit/>
@@ -7774,16 +7883,15 @@
           <a:p>
             <a:r>
               <a:rPr lang="en-US" dirty="0"/>
-              <a:t>Poster and </a:t>
-            </a:r>
-            <a:r>
-              <a:rPr lang="en-US" dirty="0" err="1"/>
-              <a:t>imdb</a:t>
-            </a:r>
-            <a:r>
+              <a:t>Recommendation</a:t>
+            </a:r>
+            <a:br>
               <a:rPr lang="en-US" dirty="0"/>
-              <a:t> score vs grossing revenue relationship and tickets sold for Top Grossing Movies in US</a:t>
-            </a:r>
+            </a:br>
+            <a:br>
+              <a:rPr lang="en-US" dirty="0"/>
+            </a:br>
+            <a:endParaRPr lang="en-US" dirty="0"/>
           </a:p>
         </p:txBody>
       </p:sp>
@@ -7792,7 +7900,7 @@
           <p:cNvPr id="3" name="Content Placeholder 2">
             <a:extLst>
               <a:ext uri="{FF2B5EF4-FFF2-40B4-BE49-F238E27FC236}">
-                <a16:creationId xmlns:a16="http://schemas.microsoft.com/office/drawing/2014/main" id="{B6CAD82D-8D1C-4B41-B498-E27A0ACC754F}"/>
+                <a16:creationId xmlns:a16="http://schemas.microsoft.com/office/drawing/2014/main" id="{0E6DE151-C365-384F-95D5-20978EDE181A}"/>
               </a:ext>
             </a:extLst>
           </p:cNvPr>
@@ -7803,205 +7911,188 @@
             <p:ph idx="1"/>
           </p:nvPr>
         </p:nvSpPr>
-        <p:spPr/>
-        <p:txBody>
-          <a:bodyPr/>
+        <p:spPr>
+          <a:xfrm>
+            <a:off x="457198" y="1100111"/>
+            <a:ext cx="4760786" cy="7789056"/>
+          </a:xfrm>
+        </p:spPr>
+        <p:txBody>
+          <a:bodyPr>
+            <a:normAutofit/>
+          </a:bodyPr>
           <a:lstStyle/>
           <a:p>
             <a:r>
               <a:rPr lang="en-US" dirty="0"/>
-              <a:t>Placeholder. </a:t>
-            </a:r>
-          </a:p>
-        </p:txBody>
-      </p:sp>
+              <a:t>Additionally, it seems the </a:t>
+            </a:r>
+            <a:r>
+              <a:rPr lang="en-US" dirty="0" err="1"/>
+              <a:t>imdb</a:t>
+            </a:r>
+            <a:r>
+              <a:rPr lang="en-US" dirty="0"/>
+              <a:t> score has more to do with success than the number of faces on the poster.</a:t>
+            </a:r>
+          </a:p>
+          <a:p>
+            <a:r>
+              <a:rPr lang="en-US" dirty="0"/>
+              <a:t>The </a:t>
+            </a:r>
+            <a:r>
+              <a:rPr lang="en-US" dirty="0" err="1"/>
+              <a:t>imdb</a:t>
+            </a:r>
+            <a:r>
+              <a:rPr lang="en-US" dirty="0"/>
+              <a:t> score is more correlated with tickets sold than the number of faces on poster are.</a:t>
+            </a:r>
+          </a:p>
+          <a:p>
+            <a:endParaRPr lang="en-US" dirty="0"/>
+          </a:p>
+          <a:p>
+            <a:endParaRPr lang="en-US" dirty="0"/>
+          </a:p>
+          <a:p>
+            <a:endParaRPr lang="en-US" dirty="0"/>
+          </a:p>
+          <a:p>
+            <a:endParaRPr lang="en-US" dirty="0"/>
+          </a:p>
+          <a:p>
+            <a:endParaRPr lang="en-US" dirty="0"/>
+          </a:p>
+          <a:p>
+            <a:endParaRPr lang="en-US" dirty="0"/>
+          </a:p>
+          <a:p>
+            <a:endParaRPr lang="en-US" dirty="0"/>
+          </a:p>
+          <a:p>
+            <a:endParaRPr lang="en-US" dirty="0"/>
+          </a:p>
+          <a:p>
+            <a:endParaRPr lang="en-US" dirty="0"/>
+          </a:p>
+          <a:p>
+            <a:endParaRPr lang="en-US" dirty="0"/>
+          </a:p>
+          <a:p>
+            <a:endParaRPr lang="en-US" dirty="0"/>
+          </a:p>
+          <a:p>
+            <a:endParaRPr lang="en-US" dirty="0"/>
+          </a:p>
+          <a:p>
+            <a:endParaRPr lang="en-US" dirty="0"/>
+          </a:p>
+          <a:p>
+            <a:endParaRPr lang="en-US" dirty="0"/>
+          </a:p>
+          <a:p>
+            <a:endParaRPr lang="en-US" dirty="0"/>
+          </a:p>
+          <a:p>
+            <a:endParaRPr lang="en-US" dirty="0"/>
+          </a:p>
+          <a:p>
+            <a:endParaRPr lang="en-US" dirty="0"/>
+          </a:p>
+          <a:p>
+            <a:endParaRPr lang="en-US" dirty="0"/>
+          </a:p>
+          <a:p>
+            <a:endParaRPr lang="en-US" dirty="0"/>
+          </a:p>
+          <a:p>
+            <a:r>
+              <a:rPr lang="en-US" dirty="0"/>
+              <a:t>My conclusion is, if there are more faces on the poster, and the </a:t>
+            </a:r>
+            <a:r>
+              <a:rPr lang="en-US" dirty="0" err="1"/>
+              <a:t>imdb</a:t>
+            </a:r>
+            <a:r>
+              <a:rPr lang="en-US" dirty="0"/>
+              <a:t> score is good then it results in more tickets sold and higher box office earnings. (at least in the US)</a:t>
+            </a:r>
+          </a:p>
+          <a:p>
+            <a:endParaRPr lang="en-US" dirty="0"/>
+          </a:p>
+          <a:p>
+            <a:endParaRPr lang="en-US" dirty="0"/>
+          </a:p>
+        </p:txBody>
+      </p:sp>
+      <p:pic>
+        <p:nvPicPr>
+          <p:cNvPr id="5" name="Picture 4">
+            <a:extLst>
+              <a:ext uri="{FF2B5EF4-FFF2-40B4-BE49-F238E27FC236}">
+                <a16:creationId xmlns:a16="http://schemas.microsoft.com/office/drawing/2014/main" id="{1FA266DA-E596-5E42-9B1C-F8AF17569C0E}"/>
+              </a:ext>
+            </a:extLst>
+          </p:cNvPr>
+          <p:cNvPicPr>
+            <a:picLocks noChangeAspect="1"/>
+          </p:cNvPicPr>
+          <p:nvPr/>
+        </p:nvPicPr>
+        <p:blipFill>
+          <a:blip r:embed="rId2"/>
+          <a:stretch>
+            <a:fillRect/>
+          </a:stretch>
+        </p:blipFill>
+        <p:spPr>
+          <a:xfrm>
+            <a:off x="-25530" y="2068036"/>
+            <a:ext cx="6172200" cy="2780270"/>
+          </a:xfrm>
+          <a:prstGeom prst="rect">
+            <a:avLst/>
+          </a:prstGeom>
+        </p:spPr>
+      </p:pic>
+      <p:pic>
+        <p:nvPicPr>
+          <p:cNvPr id="10" name="Picture 9" descr="Chart, scatter chart&#10;&#10;Description automatically generated">
+            <a:extLst>
+              <a:ext uri="{FF2B5EF4-FFF2-40B4-BE49-F238E27FC236}">
+                <a16:creationId xmlns:a16="http://schemas.microsoft.com/office/drawing/2014/main" id="{632FCDCB-F545-0247-AECA-6F5B855EF441}"/>
+              </a:ext>
+            </a:extLst>
+          </p:cNvPr>
+          <p:cNvPicPr>
+            <a:picLocks noChangeAspect="1"/>
+          </p:cNvPicPr>
+          <p:nvPr/>
+        </p:nvPicPr>
+        <p:blipFill>
+          <a:blip r:embed="rId3"/>
+          <a:stretch>
+            <a:fillRect/>
+          </a:stretch>
+        </p:blipFill>
+        <p:spPr>
+          <a:xfrm>
+            <a:off x="0" y="4740413"/>
+            <a:ext cx="6172200" cy="3175000"/>
+          </a:xfrm>
+          <a:prstGeom prst="rect">
+            <a:avLst/>
+          </a:prstGeom>
+        </p:spPr>
+      </p:pic>
     </p:spTree>
     <p:extLst>
       <p:ext uri="{BB962C8B-B14F-4D97-AF65-F5344CB8AC3E}">
-        <p14:creationId xmlns:p14="http://schemas.microsoft.com/office/powerpoint/2010/main" val="3455715435"/>
-      </p:ext>
-    </p:extLst>
-  </p:cSld>
-  <p:clrMapOvr>
-    <a:masterClrMapping/>
-  </p:clrMapOvr>
-</p:sld>
-</file>
-
-<file path=ppt/slides/slide15.xml><?xml version="1.0" encoding="utf-8"?>
-<p:sld xmlns:a="http://schemas.openxmlformats.org/drawingml/2006/main" xmlns:r="http://schemas.openxmlformats.org/officeDocument/2006/relationships" xmlns:p="http://schemas.openxmlformats.org/presentationml/2006/main">
-  <p:cSld>
-    <p:spTree>
-      <p:nvGrpSpPr>
-        <p:cNvPr id="1" name=""/>
-        <p:cNvGrpSpPr/>
-        <p:nvPr/>
-      </p:nvGrpSpPr>
-      <p:grpSpPr>
-        <a:xfrm>
-          <a:off x="0" y="0"/>
-          <a:ext cx="0" cy="0"/>
-          <a:chOff x="0" y="0"/>
-          <a:chExt cx="0" cy="0"/>
-        </a:xfrm>
-      </p:grpSpPr>
-      <p:sp>
-        <p:nvSpPr>
-          <p:cNvPr id="2" name="Title 1">
-            <a:extLst>
-              <a:ext uri="{FF2B5EF4-FFF2-40B4-BE49-F238E27FC236}">
-                <a16:creationId xmlns:a16="http://schemas.microsoft.com/office/drawing/2014/main" id="{9BE6DBF0-83E4-444A-A71C-73DE167B1708}"/>
-              </a:ext>
-            </a:extLst>
-          </p:cNvPr>
-          <p:cNvSpPr>
-            <a:spLocks noGrp="1"/>
-          </p:cNvSpPr>
-          <p:nvPr>
-            <p:ph type="title"/>
-          </p:nvPr>
-        </p:nvSpPr>
-        <p:spPr/>
-        <p:txBody>
-          <a:bodyPr/>
-          <a:lstStyle/>
-          <a:p>
-            <a:r>
-              <a:rPr lang="en-US" dirty="0"/>
-              <a:t>Poster and </a:t>
-            </a:r>
-            <a:r>
-              <a:rPr lang="en-US" dirty="0" err="1"/>
-              <a:t>imdb</a:t>
-            </a:r>
-            <a:r>
-              <a:rPr lang="en-US" dirty="0"/>
-              <a:t> score vs grossing revenue relationship and tickets sold for Top Grossing Movies in US (cont.)</a:t>
-            </a:r>
-          </a:p>
-        </p:txBody>
-      </p:sp>
-      <p:sp>
-        <p:nvSpPr>
-          <p:cNvPr id="3" name="Content Placeholder 2">
-            <a:extLst>
-              <a:ext uri="{FF2B5EF4-FFF2-40B4-BE49-F238E27FC236}">
-                <a16:creationId xmlns:a16="http://schemas.microsoft.com/office/drawing/2014/main" id="{8A670D53-267A-A64C-BA24-2964C41E0F6B}"/>
-              </a:ext>
-            </a:extLst>
-          </p:cNvPr>
-          <p:cNvSpPr>
-            <a:spLocks noGrp="1"/>
-          </p:cNvSpPr>
-          <p:nvPr>
-            <p:ph idx="1"/>
-          </p:nvPr>
-        </p:nvSpPr>
-        <p:spPr/>
-        <p:txBody>
-          <a:bodyPr/>
-          <a:lstStyle/>
-          <a:p>
-            <a:r>
-              <a:rPr lang="en-US" dirty="0"/>
-              <a:t>PLACEHOLDER</a:t>
-            </a:r>
-            <a:r>
-              <a:rPr lang="en-US" dirty="0">
-                <a:sym typeface="Wingdings" pitchFamily="2" charset="2"/>
-              </a:rPr>
-              <a:t>: (will edit)</a:t>
-            </a:r>
-            <a:endParaRPr lang="en-US" dirty="0"/>
-          </a:p>
-          <a:p>
-            <a:r>
-              <a:rPr lang="en-US" dirty="0"/>
-              <a:t>For the highest grossing films per year (US) you can see there is a positive correlation between every variable.</a:t>
-            </a:r>
-          </a:p>
-          <a:p>
-            <a:r>
-              <a:rPr lang="en-US" dirty="0"/>
-              <a:t>Specifically, the number of faces is most correlated with the total earning per year and the amount of tickets sold (total per year is without inflation which is what I'm referring to).</a:t>
-            </a:r>
-          </a:p>
-          <a:p>
-            <a:endParaRPr lang="en-US" dirty="0"/>
-          </a:p>
-          <a:p>
-            <a:r>
-              <a:rPr lang="en-US" dirty="0"/>
-              <a:t>There is also a SLIGHT positive correlation between the number of faces on the poster and the </a:t>
-            </a:r>
-            <a:r>
-              <a:rPr lang="en-US" dirty="0" err="1"/>
-              <a:t>imdb</a:t>
-            </a:r>
-            <a:r>
-              <a:rPr lang="en-US" dirty="0"/>
-              <a:t> score. So the number of faces on a poster could possibly influence the </a:t>
-            </a:r>
-            <a:r>
-              <a:rPr lang="en-US" dirty="0" err="1"/>
-              <a:t>imdb</a:t>
-            </a:r>
-            <a:r>
-              <a:rPr lang="en-US" dirty="0"/>
-              <a:t> score.  </a:t>
-            </a:r>
-          </a:p>
-          <a:p>
-            <a:endParaRPr lang="en-US" dirty="0"/>
-          </a:p>
-          <a:p>
-            <a:r>
-              <a:rPr lang="en-US" dirty="0"/>
-              <a:t>Additionally, it seems the </a:t>
-            </a:r>
-            <a:r>
-              <a:rPr lang="en-US" dirty="0" err="1"/>
-              <a:t>imdb</a:t>
-            </a:r>
-            <a:r>
-              <a:rPr lang="en-US" dirty="0"/>
-              <a:t> score has more to do with success than the number of faces on the poster.</a:t>
-            </a:r>
-          </a:p>
-          <a:p>
-            <a:r>
-              <a:rPr lang="en-US" dirty="0"/>
-              <a:t>The </a:t>
-            </a:r>
-            <a:r>
-              <a:rPr lang="en-US" dirty="0" err="1"/>
-              <a:t>imdb</a:t>
-            </a:r>
-            <a:r>
-              <a:rPr lang="en-US" dirty="0"/>
-              <a:t> score is more correlated with tickets sold than the number of faces on poster are.</a:t>
-            </a:r>
-          </a:p>
-          <a:p>
-            <a:r>
-              <a:rPr lang="en-US" dirty="0"/>
-              <a:t>My conclusion is, if there are more faces on the poster, and the </a:t>
-            </a:r>
-            <a:r>
-              <a:rPr lang="en-US" dirty="0" err="1"/>
-              <a:t>imdb</a:t>
-            </a:r>
-            <a:r>
-              <a:rPr lang="en-US" dirty="0"/>
-              <a:t> score is good then it results in more tickets sold and higher box office earnings.</a:t>
-            </a:r>
-          </a:p>
-        </p:txBody>
-      </p:sp>
-    </p:spTree>
-    <p:extLst>
-      <p:ext uri="{BB962C8B-B14F-4D97-AF65-F5344CB8AC3E}">
-        <p14:creationId xmlns:p14="http://schemas.microsoft.com/office/powerpoint/2010/main" val="836177933"/>
+        <p14:creationId xmlns:p14="http://schemas.microsoft.com/office/powerpoint/2010/main" val="3813266993"/>
       </p:ext>
     </p:extLst>
   </p:cSld>
@@ -9606,7 +9697,12 @@
             <p:ph type="title"/>
           </p:nvPr>
         </p:nvSpPr>
-        <p:spPr/>
+        <p:spPr>
+          <a:xfrm>
+            <a:off x="457199" y="474559"/>
+            <a:ext cx="4760785" cy="1761067"/>
+          </a:xfrm>
+        </p:spPr>
         <p:txBody>
           <a:bodyPr/>
           <a:lstStyle/>
@@ -9634,44 +9730,142 @@
             <p:ph idx="1"/>
           </p:nvPr>
         </p:nvSpPr>
-        <p:spPr/>
-        <p:txBody>
-          <a:bodyPr/>
+        <p:spPr>
+          <a:xfrm>
+            <a:off x="457199" y="3495077"/>
+            <a:ext cx="4760786" cy="5174364"/>
+          </a:xfrm>
+        </p:spPr>
+        <p:txBody>
+          <a:bodyPr>
+            <a:normAutofit fontScale="92500" lnSpcReduction="20000"/>
+          </a:bodyPr>
           <a:lstStyle/>
           <a:p>
             <a:r>
               <a:rPr lang="en-US" dirty="0"/>
-              <a:t>As you can see average ticket price has a negative correlation with the amount of tickets sold.</a:t>
+              <a:t>As you can see, the average ticket price has a negative correlation with the amount of tickets sold.</a:t>
             </a:r>
           </a:p>
           <a:p>
             <a:r>
               <a:rPr lang="en-US" dirty="0"/>
-              <a:t>As ticket prices get higher, less tickets are sold, which will be show below in scatter plot. </a:t>
-            </a:r>
+              <a:t>As ticket prices get higher, less tickets are sold, which will be shown below in a scatter plot. </a:t>
+            </a:r>
+          </a:p>
+          <a:p>
+            <a:endParaRPr lang="en-US" dirty="0"/>
+          </a:p>
+          <a:p>
+            <a:endParaRPr lang="en-US" dirty="0"/>
+          </a:p>
+          <a:p>
+            <a:endParaRPr lang="en-US" dirty="0"/>
+          </a:p>
+          <a:p>
+            <a:endParaRPr lang="en-US" dirty="0"/>
+          </a:p>
+          <a:p>
+            <a:endParaRPr lang="en-US" dirty="0"/>
+          </a:p>
+          <a:p>
+            <a:endParaRPr lang="en-US" dirty="0"/>
+          </a:p>
+          <a:p>
+            <a:endParaRPr lang="en-US" dirty="0"/>
+          </a:p>
+          <a:p>
+            <a:endParaRPr lang="en-US" dirty="0"/>
+          </a:p>
+          <a:p>
+            <a:endParaRPr lang="en-US" dirty="0"/>
+          </a:p>
+          <a:p>
+            <a:endParaRPr lang="en-US" dirty="0"/>
+          </a:p>
+          <a:p>
+            <a:endParaRPr lang="en-US" dirty="0"/>
           </a:p>
           <a:p>
             <a:r>
               <a:rPr lang="en-US" dirty="0"/>
-              <a:t>However, as ticket prices get higher, the total box office</a:t>
+              <a:t>However, as ticket prices get higher, the total box office gets higher, as seen in the correlations.</a:t>
             </a:r>
           </a:p>
           <a:p>
             <a:r>
               <a:rPr lang="en-US" dirty="0"/>
-              <a:t>Conclusion: Studios would rather have less consumers but have increased prices because the higher ticket price results in more money for the </a:t>
-            </a:r>
-            <a:r>
-              <a:rPr lang="en-US" dirty="0" err="1"/>
-              <a:t>studioe</a:t>
-            </a:r>
+              <a:t>When excluding data from 2020 and 2021 the correlations are almost the same.</a:t>
+            </a:r>
+          </a:p>
+          <a:p>
             <a:r>
               <a:rPr lang="en-US" dirty="0"/>
-              <a:t> goes up.</a:t>
-            </a:r>
-          </a:p>
-        </p:txBody>
-      </p:sp>
+              <a:t>Conclusion: Studios would rather have less consumers but have increased ticket prices because the higher ticket price results in more money for the studio/theater.</a:t>
+            </a:r>
+          </a:p>
+        </p:txBody>
+      </p:sp>
+      <p:pic>
+        <p:nvPicPr>
+          <p:cNvPr id="7" name="Picture 6" descr="Application&#10;&#10;Description automatically generated with low confidence">
+            <a:extLst>
+              <a:ext uri="{FF2B5EF4-FFF2-40B4-BE49-F238E27FC236}">
+                <a16:creationId xmlns:a16="http://schemas.microsoft.com/office/drawing/2014/main" id="{34CD251A-3E3B-6543-9FA2-3678761B2E33}"/>
+              </a:ext>
+            </a:extLst>
+          </p:cNvPr>
+          <p:cNvPicPr>
+            <a:picLocks noChangeAspect="1"/>
+          </p:cNvPicPr>
+          <p:nvPr/>
+        </p:nvPicPr>
+        <p:blipFill>
+          <a:blip r:embed="rId2"/>
+          <a:stretch>
+            <a:fillRect/>
+          </a:stretch>
+        </p:blipFill>
+        <p:spPr>
+          <a:xfrm>
+            <a:off x="228601" y="4229448"/>
+            <a:ext cx="6172200" cy="2629090"/>
+          </a:xfrm>
+          <a:prstGeom prst="rect">
+            <a:avLst/>
+          </a:prstGeom>
+        </p:spPr>
+      </p:pic>
+      <p:pic>
+        <p:nvPicPr>
+          <p:cNvPr id="11" name="Picture 10" descr="Table&#10;&#10;Description automatically generated">
+            <a:extLst>
+              <a:ext uri="{FF2B5EF4-FFF2-40B4-BE49-F238E27FC236}">
+                <a16:creationId xmlns:a16="http://schemas.microsoft.com/office/drawing/2014/main" id="{4C66C95E-9868-AD4C-B27D-08314A8297C6}"/>
+              </a:ext>
+            </a:extLst>
+          </p:cNvPr>
+          <p:cNvPicPr>
+            <a:picLocks noChangeAspect="1"/>
+          </p:cNvPicPr>
+          <p:nvPr/>
+        </p:nvPicPr>
+        <p:blipFill>
+          <a:blip r:embed="rId3"/>
+          <a:stretch>
+            <a:fillRect/>
+          </a:stretch>
+        </p:blipFill>
+        <p:spPr>
+          <a:xfrm>
+            <a:off x="0" y="1822979"/>
+            <a:ext cx="6858000" cy="1672098"/>
+          </a:xfrm>
+          <a:prstGeom prst="rect">
+            <a:avLst/>
+          </a:prstGeom>
+        </p:spPr>
+      </p:pic>
     </p:spTree>
     <p:extLst>
       <p:ext uri="{BB962C8B-B14F-4D97-AF65-F5344CB8AC3E}">
@@ -9742,7 +9936,7 @@
             </a:r>
             <a:r>
               <a:rPr lang="en-US" sz="1600" dirty="0"/>
-              <a:t> likes is not a good indicator for earnings.</a:t>
+              <a:t> likes is not a good indicator for earnings. </a:t>
             </a:r>
           </a:p>
           <a:p>
@@ -9878,7 +10072,7 @@
             </a:pPr>
             <a:r>
               <a:rPr lang="en-US" sz="1600" dirty="0"/>
-              <a:t>IMDB score gives some indication but is still not a good feature on its own to help in predicting higher earnings. </a:t>
+              <a:t>IMDB score gives some indication but is still not a good feature on its own to help in predicting higher earnings. (data set contains movies from many countries and many years)</a:t>
             </a:r>
           </a:p>
           <a:p>
@@ -10220,23 +10414,6 @@
 </file>
 
 <file path=customXml/item1.xml><?xml version="1.0" encoding="utf-8"?>
-<?mso-contentType ?>
-<FormTemplates xmlns="http://schemas.microsoft.com/sharepoint/v3/contenttype/forms">
-  <Display>DocumentLibraryForm</Display>
-  <Edit>DocumentLibraryForm</Edit>
-  <New>DocumentLibraryForm</New>
-</FormTemplates>
-</file>
-
-<file path=customXml/item2.xml><?xml version="1.0" encoding="utf-8"?>
-<p:properties xmlns:p="http://schemas.microsoft.com/office/2006/metadata/properties" xmlns:xsi="http://www.w3.org/2001/XMLSchema-instance" xmlns:pc="http://schemas.microsoft.com/office/infopath/2007/PartnerControls">
-  <documentManagement>
-    <MediaServiceKeyPoints xmlns="ef88797d-310b-4d46-ad9c-0c23fa0c8d45" xsi:nil="true"/>
-  </documentManagement>
-</p:properties>
-</file>
-
-<file path=customXml/item3.xml><?xml version="1.0" encoding="utf-8"?>
 <ct:contentTypeSchema xmlns:ct="http://schemas.microsoft.com/office/2006/metadata/contentType" xmlns:ma="http://schemas.microsoft.com/office/2006/metadata/properties/metaAttributes" ct:_="" ma:_="" ma:contentTypeName="Document" ma:contentTypeID="0x0101005F02E0EF7D44C04B9FA644DBFF45FF6A" ma:contentTypeVersion="13" ma:contentTypeDescription="Create a new document." ma:contentTypeScope="" ma:versionID="206b9469efed5238e3299da57cdc015e">
   <xsd:schema xmlns:xsd="http://www.w3.org/2001/XMLSchema" xmlns:xs="http://www.w3.org/2001/XMLSchema" xmlns:p="http://schemas.microsoft.com/office/2006/metadata/properties" xmlns:ns2="876de33e-aaa5-4507-9b92-b84e676ded0d" xmlns:ns3="ef88797d-310b-4d46-ad9c-0c23fa0c8d45" targetNamespace="http://schemas.microsoft.com/office/2006/metadata/properties" ma:root="true" ma:fieldsID="281ed500249cd3fe925a7af84a8b56c4" ns2:_="" ns3:_="">
     <xsd:import namespace="876de33e-aaa5-4507-9b92-b84e676ded0d"/>
@@ -10459,25 +10636,24 @@
 </ct:contentTypeSchema>
 </file>
 
-<file path=customXml/itemProps1.xml><?xml version="1.0" encoding="utf-8"?>
-<ds:datastoreItem xmlns:ds="http://schemas.openxmlformats.org/officeDocument/2006/customXml" ds:itemID="{01B9FE9E-4225-43A8-A8C9-61BAE9CED68F}">
-  <ds:schemaRefs>
-    <ds:schemaRef ds:uri="http://schemas.microsoft.com/sharepoint/v3/contenttype/forms"/>
-  </ds:schemaRefs>
-</ds:datastoreItem>
+<file path=customXml/item2.xml><?xml version="1.0" encoding="utf-8"?>
+<?mso-contentType ?>
+<FormTemplates xmlns="http://schemas.microsoft.com/sharepoint/v3/contenttype/forms">
+  <Display>DocumentLibraryForm</Display>
+  <Edit>DocumentLibraryForm</Edit>
+  <New>DocumentLibraryForm</New>
+</FormTemplates>
 </file>
 
-<file path=customXml/itemProps2.xml><?xml version="1.0" encoding="utf-8"?>
-<ds:datastoreItem xmlns:ds="http://schemas.openxmlformats.org/officeDocument/2006/customXml" ds:itemID="{BD0E37F7-73A9-4D3D-9C26-F85A847C247A}">
-  <ds:schemaRefs>
-    <ds:schemaRef ds:uri="http://schemas.microsoft.com/office/2006/metadata/properties"/>
-    <ds:schemaRef ds:uri="http://schemas.microsoft.com/office/infopath/2007/PartnerControls"/>
-    <ds:schemaRef ds:uri="ef88797d-310b-4d46-ad9c-0c23fa0c8d45"/>
-  </ds:schemaRefs>
-</ds:datastoreItem>
+<file path=customXml/item3.xml><?xml version="1.0" encoding="utf-8"?>
+<p:properties xmlns:p="http://schemas.microsoft.com/office/2006/metadata/properties" xmlns:xsi="http://www.w3.org/2001/XMLSchema-instance" xmlns:pc="http://schemas.microsoft.com/office/infopath/2007/PartnerControls">
+  <documentManagement>
+    <MediaServiceKeyPoints xmlns="ef88797d-310b-4d46-ad9c-0c23fa0c8d45" xsi:nil="true"/>
+  </documentManagement>
+</p:properties>
 </file>
 
-<file path=customXml/itemProps3.xml><?xml version="1.0" encoding="utf-8"?>
+<file path=customXml/itemProps1.xml><?xml version="1.0" encoding="utf-8"?>
 <ds:datastoreItem xmlns:ds="http://schemas.openxmlformats.org/officeDocument/2006/customXml" ds:itemID="{F28CF33A-5C4D-495F-BC38-FDA3553FE523}">
   <ds:schemaRefs>
     <ds:schemaRef ds:uri="http://schemas.microsoft.com/office/2006/metadata/contentType"/>
@@ -10494,4 +10670,22 @@
     <ds:schemaRef ds:uri="http://schemas.microsoft.com/internal/obd"/>
   </ds:schemaRefs>
 </ds:datastoreItem>
+</file>
+
+<file path=customXml/itemProps2.xml><?xml version="1.0" encoding="utf-8"?>
+<ds:datastoreItem xmlns:ds="http://schemas.openxmlformats.org/officeDocument/2006/customXml" ds:itemID="{01B9FE9E-4225-43A8-A8C9-61BAE9CED68F}">
+  <ds:schemaRefs>
+    <ds:schemaRef ds:uri="http://schemas.microsoft.com/sharepoint/v3/contenttype/forms"/>
+  </ds:schemaRefs>
+</ds:datastoreItem>
+</file>
+
+<file path=customXml/itemProps3.xml><?xml version="1.0" encoding="utf-8"?>
+<ds:datastoreItem xmlns:ds="http://schemas.openxmlformats.org/officeDocument/2006/customXml" ds:itemID="{BD0E37F7-73A9-4D3D-9C26-F85A847C247A}">
+  <ds:schemaRefs>
+    <ds:schemaRef ds:uri="http://schemas.microsoft.com/office/2006/metadata/properties"/>
+    <ds:schemaRef ds:uri="http://schemas.microsoft.com/office/infopath/2007/PartnerControls"/>
+    <ds:schemaRef ds:uri="ef88797d-310b-4d46-ad9c-0c23fa0c8d45"/>
+  </ds:schemaRefs>
+</ds:datastoreItem>
 </file>
</xml_diff>